<commit_message>
prezentace finish konference kveten
</commit_message>
<xml_diff>
--- a/diagrams/Prezentace1_2013-05-02_v1.pptx
+++ b/diagrams/Prezentace1_2013-05-02_v1.pptx
@@ -7,6 +7,27 @@
   <p:sldIdLst>
     <p:sldId id="256" r:id="rId2"/>
     <p:sldId id="257" r:id="rId3"/>
+    <p:sldId id="258" r:id="rId4"/>
+    <p:sldId id="259" r:id="rId5"/>
+    <p:sldId id="272" r:id="rId6"/>
+    <p:sldId id="273" r:id="rId7"/>
+    <p:sldId id="260" r:id="rId8"/>
+    <p:sldId id="261" r:id="rId9"/>
+    <p:sldId id="262" r:id="rId10"/>
+    <p:sldId id="263" r:id="rId11"/>
+    <p:sldId id="264" r:id="rId12"/>
+    <p:sldId id="267" r:id="rId13"/>
+    <p:sldId id="268" r:id="rId14"/>
+    <p:sldId id="269" r:id="rId15"/>
+    <p:sldId id="274" r:id="rId16"/>
+    <p:sldId id="275" r:id="rId17"/>
+    <p:sldId id="276" r:id="rId18"/>
+    <p:sldId id="277" r:id="rId19"/>
+    <p:sldId id="270" r:id="rId20"/>
+    <p:sldId id="271" r:id="rId21"/>
+    <p:sldId id="265" r:id="rId22"/>
+    <p:sldId id="266" r:id="rId23"/>
+    <p:sldId id="278" r:id="rId24"/>
   </p:sldIdLst>
   <p:sldSz cx="9144000" cy="6858000" type="screen4x3"/>
   <p:notesSz cx="6858000" cy="9144000"/>
@@ -2573,9 +2594,18 @@
 <p:sldMaster xmlns:a="http://schemas.openxmlformats.org/drawingml/2006/main" xmlns:r="http://schemas.openxmlformats.org/officeDocument/2006/relationships" xmlns:p="http://schemas.openxmlformats.org/presentationml/2006/main">
   <p:cSld>
     <p:bg>
-      <p:bgRef idx="1001">
-        <a:schemeClr val="bg1"/>
-      </p:bgRef>
+      <p:bgPr>
+        <a:blipFill dpi="0" rotWithShape="1">
+          <a:blip r:embed="rId13">
+            <a:lum/>
+          </a:blip>
+          <a:srcRect/>
+          <a:stretch>
+            <a:fillRect l="20000" r="-20000"/>
+          </a:stretch>
+        </a:blipFill>
+        <a:effectLst/>
+      </p:bgPr>
     </p:bg>
     <p:spTree>
       <p:nvGrpSpPr>
@@ -3082,6 +3112,20 @@
 <file path=ppt/slides/slide1.xml><?xml version="1.0" encoding="utf-8"?>
 <p:sld xmlns:a="http://schemas.openxmlformats.org/drawingml/2006/main" xmlns:r="http://schemas.openxmlformats.org/officeDocument/2006/relationships" xmlns:p="http://schemas.openxmlformats.org/presentationml/2006/main">
   <p:cSld>
+    <p:bg>
+      <p:bgPr>
+        <a:blipFill dpi="0" rotWithShape="1">
+          <a:blip r:embed="rId2">
+            <a:lum/>
+          </a:blip>
+          <a:srcRect/>
+          <a:stretch>
+            <a:fillRect/>
+          </a:stretch>
+        </a:blipFill>
+        <a:effectLst/>
+      </p:bgPr>
+    </p:bg>
     <p:spTree>
       <p:nvGrpSpPr>
         <p:cNvPr id="1" name=""/>
@@ -3116,7 +3160,7 @@
               <a:t>myStore</a:t>
             </a:r>
             <a:r>
-              <a:rPr lang="cs-CZ" smtClean="0"/>
+              <a:rPr lang="cs-CZ" dirty="0" smtClean="0"/>
               <a:t> mobile</a:t>
             </a:r>
             <a:endParaRPr lang="cs-CZ" dirty="0"/>
@@ -3143,6 +3187,48 @@
               <a:t>Představení mobilní aplikace</a:t>
             </a:r>
             <a:endParaRPr lang="cs-CZ" dirty="0"/>
+          </a:p>
+        </p:txBody>
+      </p:sp>
+      <p:sp>
+        <p:nvSpPr>
+          <p:cNvPr id="4" name="TextovéPole 3"/>
+          <p:cNvSpPr txBox="1"/>
+          <p:nvPr/>
+        </p:nvSpPr>
+        <p:spPr>
+          <a:xfrm>
+            <a:off x="6660232" y="6165304"/>
+            <a:ext cx="2114361" cy="369332"/>
+          </a:xfrm>
+          <a:prstGeom prst="rect">
+            <a:avLst/>
+          </a:prstGeom>
+          <a:noFill/>
+        </p:spPr>
+        <p:txBody>
+          <a:bodyPr wrap="none" rtlCol="0">
+            <a:spAutoFit/>
+          </a:bodyPr>
+          <a:lstStyle/>
+          <a:p>
+            <a:r>
+              <a:rPr lang="cs-CZ" dirty="0" smtClean="0">
+                <a:solidFill>
+                  <a:schemeClr val="bg1">
+                    <a:lumMod val="50000"/>
+                  </a:schemeClr>
+                </a:solidFill>
+              </a:rPr>
+              <a:t>Michael Žabka, 2013</a:t>
+            </a:r>
+            <a:endParaRPr lang="cs-CZ" dirty="0">
+              <a:solidFill>
+                <a:schemeClr val="bg1">
+                  <a:lumMod val="50000"/>
+                </a:schemeClr>
+              </a:solidFill>
+            </a:endParaRPr>
           </a:p>
         </p:txBody>
       </p:sp>
@@ -3156,6 +3242,1797 @@
   <p:clrMapOvr>
     <a:masterClrMapping/>
   </p:clrMapOvr>
+  <mc:AlternateContent xmlns:mc="http://schemas.openxmlformats.org/markup-compatibility/2006">
+    <mc:Choice xmlns:p14="http://schemas.microsoft.com/office/powerpoint/2010/main" Requires="p14">
+      <p:transition>
+        <p14:prism/>
+      </p:transition>
+    </mc:Choice>
+    <mc:Fallback>
+      <p:transition>
+        <p:fade/>
+      </p:transition>
+    </mc:Fallback>
+  </mc:AlternateContent>
+  <p:timing>
+    <p:tnLst>
+      <p:par>
+        <p:cTn id="1" dur="indefinite" restart="never" nodeType="tmRoot"/>
+      </p:par>
+    </p:tnLst>
+  </p:timing>
+</p:sld>
+</file>
+
+<file path=ppt/slides/slide10.xml><?xml version="1.0" encoding="utf-8"?>
+<p:sld xmlns:a="http://schemas.openxmlformats.org/drawingml/2006/main" xmlns:r="http://schemas.openxmlformats.org/officeDocument/2006/relationships" xmlns:p="http://schemas.openxmlformats.org/presentationml/2006/main">
+  <p:cSld>
+    <p:spTree>
+      <p:nvGrpSpPr>
+        <p:cNvPr id="1" name=""/>
+        <p:cNvGrpSpPr/>
+        <p:nvPr/>
+      </p:nvGrpSpPr>
+      <p:grpSpPr>
+        <a:xfrm>
+          <a:off x="0" y="0"/>
+          <a:ext cx="0" cy="0"/>
+          <a:chOff x="0" y="0"/>
+          <a:chExt cx="0" cy="0"/>
+        </a:xfrm>
+      </p:grpSpPr>
+      <p:pic>
+        <p:nvPicPr>
+          <p:cNvPr id="1026" name="Picture 2"/>
+          <p:cNvPicPr>
+            <a:picLocks noChangeAspect="1" noChangeArrowheads="1"/>
+          </p:cNvPicPr>
+          <p:nvPr/>
+        </p:nvPicPr>
+        <p:blipFill>
+          <a:blip r:embed="rId2">
+            <a:extLst>
+              <a:ext uri="{28A0092B-C50C-407E-A947-70E740481C1C}">
+                <a14:useLocalDpi xmlns:a14="http://schemas.microsoft.com/office/drawing/2010/main" val="0"/>
+              </a:ext>
+            </a:extLst>
+          </a:blip>
+          <a:stretch>
+            <a:fillRect/>
+          </a:stretch>
+        </p:blipFill>
+        <p:spPr bwMode="auto">
+          <a:xfrm>
+            <a:off x="0" y="-10953"/>
+            <a:ext cx="3795174" cy="6868953"/>
+          </a:xfrm>
+          <a:prstGeom prst="rect">
+            <a:avLst/>
+          </a:prstGeom>
+          <a:noFill/>
+          <a:extLst>
+            <a:ext uri="{909E8E84-426E-40DD-AFC4-6F175D3DCCD1}">
+              <a14:hiddenFill xmlns:a14="http://schemas.microsoft.com/office/drawing/2010/main">
+                <a:solidFill>
+                  <a:srgbClr val="FFFFFF"/>
+                </a:solidFill>
+              </a14:hiddenFill>
+            </a:ext>
+          </a:extLst>
+        </p:spPr>
+      </p:pic>
+      <p:sp>
+        <p:nvSpPr>
+          <p:cNvPr id="2" name="Nadpis 1"/>
+          <p:cNvSpPr>
+            <a:spLocks noGrp="1"/>
+          </p:cNvSpPr>
+          <p:nvPr>
+            <p:ph type="title"/>
+          </p:nvPr>
+        </p:nvSpPr>
+        <p:spPr>
+          <a:xfrm>
+            <a:off x="4211960" y="274638"/>
+            <a:ext cx="4474839" cy="1143000"/>
+          </a:xfrm>
+        </p:spPr>
+        <p:txBody>
+          <a:bodyPr/>
+          <a:lstStyle/>
+          <a:p>
+            <a:pPr algn="r"/>
+            <a:r>
+              <a:rPr lang="cs-CZ" dirty="0" smtClean="0"/>
+              <a:t>Nákupy a seznamy</a:t>
+            </a:r>
+            <a:endParaRPr lang="cs-CZ" dirty="0"/>
+          </a:p>
+        </p:txBody>
+      </p:sp>
+      <p:sp>
+        <p:nvSpPr>
+          <p:cNvPr id="3" name="Zástupný symbol pro obsah 2"/>
+          <p:cNvSpPr>
+            <a:spLocks noGrp="1"/>
+          </p:cNvSpPr>
+          <p:nvPr>
+            <p:ph idx="1"/>
+          </p:nvPr>
+        </p:nvSpPr>
+        <p:spPr>
+          <a:xfrm>
+            <a:off x="4067944" y="1600200"/>
+            <a:ext cx="4618856" cy="4525963"/>
+          </a:xfrm>
+        </p:spPr>
+        <p:txBody>
+          <a:bodyPr>
+            <a:normAutofit/>
+          </a:bodyPr>
+          <a:lstStyle/>
+          <a:p>
+            <a:r>
+              <a:rPr lang="cs-CZ" dirty="0" smtClean="0"/>
+              <a:t>Nákupní seznamy</a:t>
+            </a:r>
+          </a:p>
+          <a:p>
+            <a:pPr lvl="1"/>
+            <a:r>
+              <a:rPr lang="cs-CZ" dirty="0" smtClean="0"/>
+              <a:t>Brzy potřebné</a:t>
+            </a:r>
+          </a:p>
+          <a:p>
+            <a:pPr lvl="1"/>
+            <a:r>
+              <a:rPr lang="cs-CZ" dirty="0" smtClean="0"/>
+              <a:t>Skupinové</a:t>
+            </a:r>
+          </a:p>
+          <a:p>
+            <a:pPr lvl="1"/>
+            <a:r>
+              <a:rPr lang="cs-CZ" dirty="0" smtClean="0"/>
+              <a:t>Úpravy</a:t>
+            </a:r>
+          </a:p>
+          <a:p>
+            <a:pPr lvl="1"/>
+            <a:r>
+              <a:rPr lang="cs-CZ" dirty="0" smtClean="0"/>
+              <a:t>Vytvoření</a:t>
+            </a:r>
+          </a:p>
+          <a:p>
+            <a:r>
+              <a:rPr lang="cs-CZ" dirty="0" smtClean="0"/>
+              <a:t>Provedené nákupy</a:t>
+            </a:r>
+          </a:p>
+          <a:p>
+            <a:pPr lvl="1"/>
+            <a:r>
+              <a:rPr lang="cs-CZ" dirty="0" smtClean="0"/>
+              <a:t>Vlastní</a:t>
+            </a:r>
+          </a:p>
+          <a:p>
+            <a:pPr lvl="1"/>
+            <a:r>
+              <a:rPr lang="cs-CZ" dirty="0" smtClean="0"/>
+              <a:t>Skupinové</a:t>
+            </a:r>
+          </a:p>
+        </p:txBody>
+      </p:sp>
+    </p:spTree>
+    <p:extLst>
+      <p:ext uri="{BB962C8B-B14F-4D97-AF65-F5344CB8AC3E}">
+        <p14:creationId xmlns:p14="http://schemas.microsoft.com/office/powerpoint/2010/main" val="166899082"/>
+      </p:ext>
+    </p:extLst>
+  </p:cSld>
+  <p:clrMapOvr>
+    <a:masterClrMapping/>
+  </p:clrMapOvr>
+  <mc:AlternateContent xmlns:mc="http://schemas.openxmlformats.org/markup-compatibility/2006">
+    <mc:Choice xmlns:p14="http://schemas.microsoft.com/office/powerpoint/2010/main" Requires="p14">
+      <p:transition>
+        <p14:prism/>
+      </p:transition>
+    </mc:Choice>
+    <mc:Fallback>
+      <p:transition>
+        <p:fade/>
+      </p:transition>
+    </mc:Fallback>
+  </mc:AlternateContent>
+  <p:timing>
+    <p:tnLst>
+      <p:par>
+        <p:cTn id="1" dur="indefinite" restart="never" nodeType="tmRoot"/>
+      </p:par>
+    </p:tnLst>
+  </p:timing>
+</p:sld>
+</file>
+
+<file path=ppt/slides/slide11.xml><?xml version="1.0" encoding="utf-8"?>
+<p:sld xmlns:a="http://schemas.openxmlformats.org/drawingml/2006/main" xmlns:r="http://schemas.openxmlformats.org/officeDocument/2006/relationships" xmlns:p="http://schemas.openxmlformats.org/presentationml/2006/main">
+  <p:cSld>
+    <p:spTree>
+      <p:nvGrpSpPr>
+        <p:cNvPr id="1" name=""/>
+        <p:cNvGrpSpPr/>
+        <p:nvPr/>
+      </p:nvGrpSpPr>
+      <p:grpSpPr>
+        <a:xfrm>
+          <a:off x="0" y="0"/>
+          <a:ext cx="0" cy="0"/>
+          <a:chOff x="0" y="0"/>
+          <a:chExt cx="0" cy="0"/>
+        </a:xfrm>
+      </p:grpSpPr>
+      <p:pic>
+        <p:nvPicPr>
+          <p:cNvPr id="1026" name="Picture 2"/>
+          <p:cNvPicPr>
+            <a:picLocks noChangeAspect="1" noChangeArrowheads="1"/>
+          </p:cNvPicPr>
+          <p:nvPr/>
+        </p:nvPicPr>
+        <p:blipFill>
+          <a:blip r:embed="rId2">
+            <a:extLst>
+              <a:ext uri="{28A0092B-C50C-407E-A947-70E740481C1C}">
+                <a14:useLocalDpi xmlns:a14="http://schemas.microsoft.com/office/drawing/2010/main" val="0"/>
+              </a:ext>
+            </a:extLst>
+          </a:blip>
+          <a:stretch>
+            <a:fillRect/>
+          </a:stretch>
+        </p:blipFill>
+        <p:spPr bwMode="auto">
+          <a:xfrm>
+            <a:off x="0" y="-10953"/>
+            <a:ext cx="3795174" cy="6868953"/>
+          </a:xfrm>
+          <a:prstGeom prst="rect">
+            <a:avLst/>
+          </a:prstGeom>
+          <a:noFill/>
+          <a:extLst>
+            <a:ext uri="{909E8E84-426E-40DD-AFC4-6F175D3DCCD1}">
+              <a14:hiddenFill xmlns:a14="http://schemas.microsoft.com/office/drawing/2010/main">
+                <a:solidFill>
+                  <a:srgbClr val="FFFFFF"/>
+                </a:solidFill>
+              </a14:hiddenFill>
+            </a:ext>
+          </a:extLst>
+        </p:spPr>
+      </p:pic>
+      <p:sp>
+        <p:nvSpPr>
+          <p:cNvPr id="2" name="Nadpis 1"/>
+          <p:cNvSpPr>
+            <a:spLocks noGrp="1"/>
+          </p:cNvSpPr>
+          <p:nvPr>
+            <p:ph type="title"/>
+          </p:nvPr>
+        </p:nvSpPr>
+        <p:spPr>
+          <a:xfrm>
+            <a:off x="4211960" y="274638"/>
+            <a:ext cx="4474839" cy="1143000"/>
+          </a:xfrm>
+        </p:spPr>
+        <p:txBody>
+          <a:bodyPr/>
+          <a:lstStyle/>
+          <a:p>
+            <a:pPr algn="r"/>
+            <a:r>
+              <a:rPr lang="cs-CZ" dirty="0" smtClean="0"/>
+              <a:t>Nákupní seznam</a:t>
+            </a:r>
+            <a:endParaRPr lang="cs-CZ" dirty="0"/>
+          </a:p>
+        </p:txBody>
+      </p:sp>
+      <p:sp>
+        <p:nvSpPr>
+          <p:cNvPr id="3" name="Zástupný symbol pro obsah 2"/>
+          <p:cNvSpPr>
+            <a:spLocks noGrp="1"/>
+          </p:cNvSpPr>
+          <p:nvPr>
+            <p:ph idx="1"/>
+          </p:nvPr>
+        </p:nvSpPr>
+        <p:spPr>
+          <a:xfrm>
+            <a:off x="4067944" y="1600200"/>
+            <a:ext cx="4618856" cy="4525963"/>
+          </a:xfrm>
+        </p:spPr>
+        <p:txBody>
+          <a:bodyPr>
+            <a:normAutofit/>
+          </a:bodyPr>
+          <a:lstStyle/>
+          <a:p>
+            <a:r>
+              <a:rPr lang="cs-CZ" dirty="0" smtClean="0"/>
+              <a:t>Zaškrtávání koupených</a:t>
+            </a:r>
+          </a:p>
+          <a:p>
+            <a:r>
+              <a:rPr lang="cs-CZ" dirty="0" smtClean="0"/>
+              <a:t>Doporučení při nákupu</a:t>
+            </a:r>
+          </a:p>
+          <a:p>
+            <a:r>
+              <a:rPr lang="cs-CZ" dirty="0" smtClean="0"/>
+              <a:t>Ceny</a:t>
+            </a:r>
+          </a:p>
+          <a:p>
+            <a:r>
+              <a:rPr lang="cs-CZ" dirty="0" smtClean="0"/>
+              <a:t>Soc. informace</a:t>
+            </a:r>
+          </a:p>
+          <a:p>
+            <a:pPr lvl="1"/>
+            <a:r>
+              <a:rPr lang="cs-CZ" dirty="0" smtClean="0"/>
+              <a:t>Hodnocení</a:t>
+            </a:r>
+          </a:p>
+          <a:p>
+            <a:pPr lvl="1"/>
+            <a:r>
+              <a:rPr lang="cs-CZ" dirty="0" smtClean="0"/>
+              <a:t>Komentáře</a:t>
+            </a:r>
+          </a:p>
+          <a:p>
+            <a:pPr lvl="1"/>
+            <a:r>
+              <a:rPr lang="cs-CZ" dirty="0"/>
+              <a:t>a</a:t>
+            </a:r>
+            <a:r>
+              <a:rPr lang="cs-CZ" dirty="0" smtClean="0"/>
+              <a:t>j.</a:t>
+            </a:r>
+          </a:p>
+        </p:txBody>
+      </p:sp>
+    </p:spTree>
+    <p:extLst>
+      <p:ext uri="{BB962C8B-B14F-4D97-AF65-F5344CB8AC3E}">
+        <p14:creationId xmlns:p14="http://schemas.microsoft.com/office/powerpoint/2010/main" val="3504140774"/>
+      </p:ext>
+    </p:extLst>
+  </p:cSld>
+  <p:clrMapOvr>
+    <a:masterClrMapping/>
+  </p:clrMapOvr>
+  <mc:AlternateContent xmlns:mc="http://schemas.openxmlformats.org/markup-compatibility/2006">
+    <mc:Choice xmlns:p14="http://schemas.microsoft.com/office/powerpoint/2010/main" Requires="p14">
+      <p:transition>
+        <p14:prism/>
+      </p:transition>
+    </mc:Choice>
+    <mc:Fallback>
+      <p:transition>
+        <p:fade/>
+      </p:transition>
+    </mc:Fallback>
+  </mc:AlternateContent>
+  <p:timing>
+    <p:tnLst>
+      <p:par>
+        <p:cTn id="1" dur="indefinite" restart="never" nodeType="tmRoot"/>
+      </p:par>
+    </p:tnLst>
+  </p:timing>
+</p:sld>
+</file>
+
+<file path=ppt/slides/slide12.xml><?xml version="1.0" encoding="utf-8"?>
+<p:sld xmlns:a="http://schemas.openxmlformats.org/drawingml/2006/main" xmlns:r="http://schemas.openxmlformats.org/officeDocument/2006/relationships" xmlns:p="http://schemas.openxmlformats.org/presentationml/2006/main">
+  <p:cSld>
+    <p:spTree>
+      <p:nvGrpSpPr>
+        <p:cNvPr id="1" name=""/>
+        <p:cNvGrpSpPr/>
+        <p:nvPr/>
+      </p:nvGrpSpPr>
+      <p:grpSpPr>
+        <a:xfrm>
+          <a:off x="0" y="0"/>
+          <a:ext cx="0" cy="0"/>
+          <a:chOff x="0" y="0"/>
+          <a:chExt cx="0" cy="0"/>
+        </a:xfrm>
+      </p:grpSpPr>
+      <p:pic>
+        <p:nvPicPr>
+          <p:cNvPr id="1026" name="Picture 2"/>
+          <p:cNvPicPr>
+            <a:picLocks noChangeAspect="1" noChangeArrowheads="1"/>
+          </p:cNvPicPr>
+          <p:nvPr/>
+        </p:nvPicPr>
+        <p:blipFill>
+          <a:blip r:embed="rId2">
+            <a:extLst>
+              <a:ext uri="{28A0092B-C50C-407E-A947-70E740481C1C}">
+                <a14:useLocalDpi xmlns:a14="http://schemas.microsoft.com/office/drawing/2010/main" val="0"/>
+              </a:ext>
+            </a:extLst>
+          </a:blip>
+          <a:stretch>
+            <a:fillRect/>
+          </a:stretch>
+        </p:blipFill>
+        <p:spPr bwMode="auto">
+          <a:xfrm>
+            <a:off x="0" y="-10953"/>
+            <a:ext cx="3795174" cy="6868953"/>
+          </a:xfrm>
+          <a:prstGeom prst="rect">
+            <a:avLst/>
+          </a:prstGeom>
+          <a:noFill/>
+          <a:extLst>
+            <a:ext uri="{909E8E84-426E-40DD-AFC4-6F175D3DCCD1}">
+              <a14:hiddenFill xmlns:a14="http://schemas.microsoft.com/office/drawing/2010/main">
+                <a:solidFill>
+                  <a:srgbClr val="FFFFFF"/>
+                </a:solidFill>
+              </a14:hiddenFill>
+            </a:ext>
+          </a:extLst>
+        </p:spPr>
+      </p:pic>
+      <p:sp>
+        <p:nvSpPr>
+          <p:cNvPr id="2" name="Nadpis 1"/>
+          <p:cNvSpPr>
+            <a:spLocks noGrp="1"/>
+          </p:cNvSpPr>
+          <p:nvPr>
+            <p:ph type="title"/>
+          </p:nvPr>
+        </p:nvSpPr>
+        <p:spPr>
+          <a:xfrm>
+            <a:off x="4211960" y="274638"/>
+            <a:ext cx="4474839" cy="1143000"/>
+          </a:xfrm>
+        </p:spPr>
+        <p:txBody>
+          <a:bodyPr>
+            <a:normAutofit fontScale="90000"/>
+          </a:bodyPr>
+          <a:lstStyle/>
+          <a:p>
+            <a:pPr algn="r"/>
+            <a:r>
+              <a:rPr lang="cs-CZ" dirty="0" smtClean="0"/>
+              <a:t>Vytváření seznamů</a:t>
+            </a:r>
+            <a:endParaRPr lang="cs-CZ" dirty="0"/>
+          </a:p>
+        </p:txBody>
+      </p:sp>
+      <p:sp>
+        <p:nvSpPr>
+          <p:cNvPr id="3" name="Zástupný symbol pro obsah 2"/>
+          <p:cNvSpPr>
+            <a:spLocks noGrp="1"/>
+          </p:cNvSpPr>
+          <p:nvPr>
+            <p:ph idx="1"/>
+          </p:nvPr>
+        </p:nvSpPr>
+        <p:spPr>
+          <a:xfrm>
+            <a:off x="4067944" y="1600200"/>
+            <a:ext cx="4618856" cy="4525963"/>
+          </a:xfrm>
+        </p:spPr>
+        <p:txBody>
+          <a:bodyPr>
+            <a:normAutofit/>
+          </a:bodyPr>
+          <a:lstStyle/>
+          <a:p>
+            <a:r>
+              <a:rPr lang="cs-CZ" dirty="0" smtClean="0"/>
+              <a:t>Doporučování položek</a:t>
+            </a:r>
+          </a:p>
+          <a:p>
+            <a:r>
+              <a:rPr lang="cs-CZ" dirty="0" smtClean="0"/>
+              <a:t>Obecné položky</a:t>
+            </a:r>
+          </a:p>
+          <a:p>
+            <a:pPr lvl="1"/>
+            <a:r>
+              <a:rPr lang="cs-CZ" sz="2400" dirty="0" smtClean="0"/>
+              <a:t>(banány, rohlíky)</a:t>
+            </a:r>
+          </a:p>
+          <a:p>
+            <a:r>
+              <a:rPr lang="cs-CZ" dirty="0" smtClean="0"/>
+              <a:t>Konkrétní položky</a:t>
+            </a:r>
+          </a:p>
+          <a:p>
+            <a:pPr lvl="1"/>
+            <a:r>
+              <a:rPr lang="cs-CZ" sz="2400" dirty="0" smtClean="0"/>
+              <a:t>(Italské banány 12,-Kč/kg…)</a:t>
+            </a:r>
+            <a:endParaRPr lang="cs-CZ" dirty="0" smtClean="0"/>
+          </a:p>
+          <a:p>
+            <a:r>
+              <a:rPr lang="cs-CZ" dirty="0" smtClean="0"/>
+              <a:t>Název seznamu</a:t>
+            </a:r>
+          </a:p>
+          <a:p>
+            <a:r>
+              <a:rPr lang="cs-CZ" dirty="0" smtClean="0"/>
+              <a:t>Soukromé, veřejné i skupinové</a:t>
+            </a:r>
+          </a:p>
+          <a:p>
+            <a:endParaRPr lang="cs-CZ" dirty="0" smtClean="0"/>
+          </a:p>
+        </p:txBody>
+      </p:sp>
+    </p:spTree>
+    <p:extLst>
+      <p:ext uri="{BB962C8B-B14F-4D97-AF65-F5344CB8AC3E}">
+        <p14:creationId xmlns:p14="http://schemas.microsoft.com/office/powerpoint/2010/main" val="2796702521"/>
+      </p:ext>
+    </p:extLst>
+  </p:cSld>
+  <p:clrMapOvr>
+    <a:masterClrMapping/>
+  </p:clrMapOvr>
+  <mc:AlternateContent xmlns:mc="http://schemas.openxmlformats.org/markup-compatibility/2006">
+    <mc:Choice xmlns:p14="http://schemas.microsoft.com/office/powerpoint/2010/main" Requires="p14">
+      <p:transition>
+        <p14:prism/>
+      </p:transition>
+    </mc:Choice>
+    <mc:Fallback>
+      <p:transition>
+        <p:fade/>
+      </p:transition>
+    </mc:Fallback>
+  </mc:AlternateContent>
+  <p:timing>
+    <p:tnLst>
+      <p:par>
+        <p:cTn id="1" dur="indefinite" restart="never" nodeType="tmRoot"/>
+      </p:par>
+    </p:tnLst>
+  </p:timing>
+</p:sld>
+</file>
+
+<file path=ppt/slides/slide13.xml><?xml version="1.0" encoding="utf-8"?>
+<p:sld xmlns:a="http://schemas.openxmlformats.org/drawingml/2006/main" xmlns:r="http://schemas.openxmlformats.org/officeDocument/2006/relationships" xmlns:p="http://schemas.openxmlformats.org/presentationml/2006/main">
+  <p:cSld>
+    <p:spTree>
+      <p:nvGrpSpPr>
+        <p:cNvPr id="1" name=""/>
+        <p:cNvGrpSpPr/>
+        <p:nvPr/>
+      </p:nvGrpSpPr>
+      <p:grpSpPr>
+        <a:xfrm>
+          <a:off x="0" y="0"/>
+          <a:ext cx="0" cy="0"/>
+          <a:chOff x="0" y="0"/>
+          <a:chExt cx="0" cy="0"/>
+        </a:xfrm>
+      </p:grpSpPr>
+      <p:pic>
+        <p:nvPicPr>
+          <p:cNvPr id="1026" name="Picture 2"/>
+          <p:cNvPicPr>
+            <a:picLocks noChangeAspect="1" noChangeArrowheads="1"/>
+          </p:cNvPicPr>
+          <p:nvPr/>
+        </p:nvPicPr>
+        <p:blipFill>
+          <a:blip r:embed="rId2">
+            <a:extLst>
+              <a:ext uri="{28A0092B-C50C-407E-A947-70E740481C1C}">
+                <a14:useLocalDpi xmlns:a14="http://schemas.microsoft.com/office/drawing/2010/main" val="0"/>
+              </a:ext>
+            </a:extLst>
+          </a:blip>
+          <a:stretch>
+            <a:fillRect/>
+          </a:stretch>
+        </p:blipFill>
+        <p:spPr bwMode="auto">
+          <a:xfrm>
+            <a:off x="0" y="-10953"/>
+            <a:ext cx="3795174" cy="6868953"/>
+          </a:xfrm>
+          <a:prstGeom prst="rect">
+            <a:avLst/>
+          </a:prstGeom>
+          <a:noFill/>
+          <a:extLst>
+            <a:ext uri="{909E8E84-426E-40DD-AFC4-6F175D3DCCD1}">
+              <a14:hiddenFill xmlns:a14="http://schemas.microsoft.com/office/drawing/2010/main">
+                <a:solidFill>
+                  <a:srgbClr val="FFFFFF"/>
+                </a:solidFill>
+              </a14:hiddenFill>
+            </a:ext>
+          </a:extLst>
+        </p:spPr>
+      </p:pic>
+      <p:sp>
+        <p:nvSpPr>
+          <p:cNvPr id="2" name="Nadpis 1"/>
+          <p:cNvSpPr>
+            <a:spLocks noGrp="1"/>
+          </p:cNvSpPr>
+          <p:nvPr>
+            <p:ph type="title"/>
+          </p:nvPr>
+        </p:nvSpPr>
+        <p:spPr>
+          <a:xfrm>
+            <a:off x="4211960" y="274638"/>
+            <a:ext cx="4474839" cy="1143000"/>
+          </a:xfrm>
+        </p:spPr>
+        <p:txBody>
+          <a:bodyPr>
+            <a:normAutofit/>
+          </a:bodyPr>
+          <a:lstStyle/>
+          <a:p>
+            <a:pPr algn="r"/>
+            <a:r>
+              <a:rPr lang="cs-CZ" dirty="0" smtClean="0"/>
+              <a:t>Recepty</a:t>
+            </a:r>
+            <a:endParaRPr lang="cs-CZ" dirty="0"/>
+          </a:p>
+        </p:txBody>
+      </p:sp>
+      <p:sp>
+        <p:nvSpPr>
+          <p:cNvPr id="3" name="Zástupný symbol pro obsah 2"/>
+          <p:cNvSpPr>
+            <a:spLocks noGrp="1"/>
+          </p:cNvSpPr>
+          <p:nvPr>
+            <p:ph idx="1"/>
+          </p:nvPr>
+        </p:nvSpPr>
+        <p:spPr>
+          <a:xfrm>
+            <a:off x="4067944" y="1600200"/>
+            <a:ext cx="4618856" cy="4525963"/>
+          </a:xfrm>
+        </p:spPr>
+        <p:txBody>
+          <a:bodyPr>
+            <a:normAutofit/>
+          </a:bodyPr>
+          <a:lstStyle/>
+          <a:p>
+            <a:r>
+              <a:rPr lang="cs-CZ" dirty="0" smtClean="0"/>
+              <a:t>Doporučené recepty</a:t>
+            </a:r>
+          </a:p>
+          <a:p>
+            <a:r>
+              <a:rPr lang="cs-CZ" dirty="0" smtClean="0"/>
+              <a:t>Ceny položek receptu</a:t>
+            </a:r>
+          </a:p>
+          <a:p>
+            <a:r>
+              <a:rPr lang="cs-CZ" dirty="0" smtClean="0"/>
+              <a:t>Vlastní recepty</a:t>
+            </a:r>
+          </a:p>
+          <a:p>
+            <a:r>
+              <a:rPr lang="cs-CZ" dirty="0" smtClean="0"/>
+              <a:t>Recepty podle položek</a:t>
+            </a:r>
+          </a:p>
+        </p:txBody>
+      </p:sp>
+    </p:spTree>
+    <p:extLst>
+      <p:ext uri="{BB962C8B-B14F-4D97-AF65-F5344CB8AC3E}">
+        <p14:creationId xmlns:p14="http://schemas.microsoft.com/office/powerpoint/2010/main" val="4149078773"/>
+      </p:ext>
+    </p:extLst>
+  </p:cSld>
+  <p:clrMapOvr>
+    <a:masterClrMapping/>
+  </p:clrMapOvr>
+  <mc:AlternateContent xmlns:mc="http://schemas.openxmlformats.org/markup-compatibility/2006">
+    <mc:Choice xmlns:p14="http://schemas.microsoft.com/office/powerpoint/2010/main" Requires="p14">
+      <p:transition>
+        <p14:prism/>
+      </p:transition>
+    </mc:Choice>
+    <mc:Fallback>
+      <p:transition>
+        <p:fade/>
+      </p:transition>
+    </mc:Fallback>
+  </mc:AlternateContent>
+  <p:timing>
+    <p:tnLst>
+      <p:par>
+        <p:cTn id="1" dur="indefinite" restart="never" nodeType="tmRoot"/>
+      </p:par>
+    </p:tnLst>
+  </p:timing>
+</p:sld>
+</file>
+
+<file path=ppt/slides/slide14.xml><?xml version="1.0" encoding="utf-8"?>
+<p:sld xmlns:a="http://schemas.openxmlformats.org/drawingml/2006/main" xmlns:r="http://schemas.openxmlformats.org/officeDocument/2006/relationships" xmlns:p="http://schemas.openxmlformats.org/presentationml/2006/main">
+  <p:cSld>
+    <p:spTree>
+      <p:nvGrpSpPr>
+        <p:cNvPr id="1" name=""/>
+        <p:cNvGrpSpPr/>
+        <p:nvPr/>
+      </p:nvGrpSpPr>
+      <p:grpSpPr>
+        <a:xfrm>
+          <a:off x="0" y="0"/>
+          <a:ext cx="0" cy="0"/>
+          <a:chOff x="0" y="0"/>
+          <a:chExt cx="0" cy="0"/>
+        </a:xfrm>
+      </p:grpSpPr>
+      <p:pic>
+        <p:nvPicPr>
+          <p:cNvPr id="1026" name="Picture 2"/>
+          <p:cNvPicPr>
+            <a:picLocks noChangeAspect="1" noChangeArrowheads="1"/>
+          </p:cNvPicPr>
+          <p:nvPr/>
+        </p:nvPicPr>
+        <p:blipFill>
+          <a:blip r:embed="rId2">
+            <a:extLst>
+              <a:ext uri="{28A0092B-C50C-407E-A947-70E740481C1C}">
+                <a14:useLocalDpi xmlns:a14="http://schemas.microsoft.com/office/drawing/2010/main" val="0"/>
+              </a:ext>
+            </a:extLst>
+          </a:blip>
+          <a:stretch>
+            <a:fillRect/>
+          </a:stretch>
+        </p:blipFill>
+        <p:spPr bwMode="auto">
+          <a:xfrm>
+            <a:off x="0" y="-10953"/>
+            <a:ext cx="3795174" cy="6868953"/>
+          </a:xfrm>
+          <a:prstGeom prst="rect">
+            <a:avLst/>
+          </a:prstGeom>
+          <a:noFill/>
+          <a:extLst>
+            <a:ext uri="{909E8E84-426E-40DD-AFC4-6F175D3DCCD1}">
+              <a14:hiddenFill xmlns:a14="http://schemas.microsoft.com/office/drawing/2010/main">
+                <a:solidFill>
+                  <a:srgbClr val="FFFFFF"/>
+                </a:solidFill>
+              </a14:hiddenFill>
+            </a:ext>
+          </a:extLst>
+        </p:spPr>
+      </p:pic>
+      <p:sp>
+        <p:nvSpPr>
+          <p:cNvPr id="2" name="Nadpis 1"/>
+          <p:cNvSpPr>
+            <a:spLocks noGrp="1"/>
+          </p:cNvSpPr>
+          <p:nvPr>
+            <p:ph type="title"/>
+          </p:nvPr>
+        </p:nvSpPr>
+        <p:spPr>
+          <a:xfrm>
+            <a:off x="4211960" y="274638"/>
+            <a:ext cx="4474839" cy="1143000"/>
+          </a:xfrm>
+        </p:spPr>
+        <p:txBody>
+          <a:bodyPr>
+            <a:normAutofit/>
+          </a:bodyPr>
+          <a:lstStyle/>
+          <a:p>
+            <a:pPr algn="r"/>
+            <a:r>
+              <a:rPr lang="cs-CZ" dirty="0" smtClean="0"/>
+              <a:t>Recept</a:t>
+            </a:r>
+            <a:endParaRPr lang="cs-CZ" dirty="0"/>
+          </a:p>
+        </p:txBody>
+      </p:sp>
+      <p:sp>
+        <p:nvSpPr>
+          <p:cNvPr id="3" name="Zástupný symbol pro obsah 2"/>
+          <p:cNvSpPr>
+            <a:spLocks noGrp="1"/>
+          </p:cNvSpPr>
+          <p:nvPr>
+            <p:ph idx="1"/>
+          </p:nvPr>
+        </p:nvSpPr>
+        <p:spPr>
+          <a:xfrm>
+            <a:off x="4067944" y="1600200"/>
+            <a:ext cx="4618856" cy="4525963"/>
+          </a:xfrm>
+        </p:spPr>
+        <p:txBody>
+          <a:bodyPr>
+            <a:normAutofit lnSpcReduction="10000"/>
+          </a:bodyPr>
+          <a:lstStyle/>
+          <a:p>
+            <a:r>
+              <a:rPr lang="cs-CZ" dirty="0" smtClean="0"/>
+              <a:t>Seznam položek</a:t>
+            </a:r>
+          </a:p>
+          <a:p>
+            <a:pPr lvl="1"/>
+            <a:r>
+              <a:rPr lang="cs-CZ" dirty="0" smtClean="0"/>
+              <a:t>Konkrétní</a:t>
+            </a:r>
+          </a:p>
+          <a:p>
+            <a:pPr lvl="1"/>
+            <a:r>
+              <a:rPr lang="cs-CZ" dirty="0" smtClean="0"/>
+              <a:t>Obecné</a:t>
+            </a:r>
+          </a:p>
+          <a:p>
+            <a:r>
+              <a:rPr lang="cs-CZ" dirty="0" smtClean="0"/>
+              <a:t>Postup vaření</a:t>
+            </a:r>
+          </a:p>
+          <a:p>
+            <a:r>
+              <a:rPr lang="cs-CZ" dirty="0" smtClean="0"/>
+              <a:t>Soc. informace</a:t>
+            </a:r>
+          </a:p>
+          <a:p>
+            <a:pPr lvl="1"/>
+            <a:r>
+              <a:rPr lang="cs-CZ" dirty="0" smtClean="0"/>
+              <a:t>Hodnocení</a:t>
+            </a:r>
+          </a:p>
+          <a:p>
+            <a:pPr lvl="1"/>
+            <a:r>
+              <a:rPr lang="cs-CZ" dirty="0" smtClean="0"/>
+              <a:t>Komentáře</a:t>
+            </a:r>
+          </a:p>
+          <a:p>
+            <a:r>
+              <a:rPr lang="cs-CZ" dirty="0" smtClean="0"/>
+              <a:t>Nákupní seznam z receptu</a:t>
+            </a:r>
+          </a:p>
+        </p:txBody>
+      </p:sp>
+    </p:spTree>
+    <p:extLst>
+      <p:ext uri="{BB962C8B-B14F-4D97-AF65-F5344CB8AC3E}">
+        <p14:creationId xmlns:p14="http://schemas.microsoft.com/office/powerpoint/2010/main" val="972135906"/>
+      </p:ext>
+    </p:extLst>
+  </p:cSld>
+  <p:clrMapOvr>
+    <a:masterClrMapping/>
+  </p:clrMapOvr>
+  <mc:AlternateContent xmlns:mc="http://schemas.openxmlformats.org/markup-compatibility/2006">
+    <mc:Choice xmlns:p14="http://schemas.microsoft.com/office/powerpoint/2010/main" Requires="p14">
+      <p:transition>
+        <p14:prism/>
+      </p:transition>
+    </mc:Choice>
+    <mc:Fallback>
+      <p:transition>
+        <p:fade/>
+      </p:transition>
+    </mc:Fallback>
+  </mc:AlternateContent>
+  <p:timing>
+    <p:tnLst>
+      <p:par>
+        <p:cTn id="1" dur="indefinite" restart="never" nodeType="tmRoot"/>
+      </p:par>
+    </p:tnLst>
+  </p:timing>
+</p:sld>
+</file>
+
+<file path=ppt/slides/slide15.xml><?xml version="1.0" encoding="utf-8"?>
+<p:sld xmlns:a="http://schemas.openxmlformats.org/drawingml/2006/main" xmlns:r="http://schemas.openxmlformats.org/officeDocument/2006/relationships" xmlns:p="http://schemas.openxmlformats.org/presentationml/2006/main">
+  <p:cSld>
+    <p:spTree>
+      <p:nvGrpSpPr>
+        <p:cNvPr id="1" name=""/>
+        <p:cNvGrpSpPr/>
+        <p:nvPr/>
+      </p:nvGrpSpPr>
+      <p:grpSpPr>
+        <a:xfrm>
+          <a:off x="0" y="0"/>
+          <a:ext cx="0" cy="0"/>
+          <a:chOff x="0" y="0"/>
+          <a:chExt cx="0" cy="0"/>
+        </a:xfrm>
+      </p:grpSpPr>
+      <p:pic>
+        <p:nvPicPr>
+          <p:cNvPr id="1026" name="Picture 2"/>
+          <p:cNvPicPr>
+            <a:picLocks noChangeAspect="1" noChangeArrowheads="1"/>
+          </p:cNvPicPr>
+          <p:nvPr/>
+        </p:nvPicPr>
+        <p:blipFill>
+          <a:blip r:embed="rId2">
+            <a:extLst>
+              <a:ext uri="{28A0092B-C50C-407E-A947-70E740481C1C}">
+                <a14:useLocalDpi xmlns:a14="http://schemas.microsoft.com/office/drawing/2010/main" val="0"/>
+              </a:ext>
+            </a:extLst>
+          </a:blip>
+          <a:stretch>
+            <a:fillRect/>
+          </a:stretch>
+        </p:blipFill>
+        <p:spPr bwMode="auto">
+          <a:xfrm>
+            <a:off x="0" y="-10953"/>
+            <a:ext cx="3795174" cy="6868953"/>
+          </a:xfrm>
+          <a:prstGeom prst="rect">
+            <a:avLst/>
+          </a:prstGeom>
+          <a:noFill/>
+          <a:extLst>
+            <a:ext uri="{909E8E84-426E-40DD-AFC4-6F175D3DCCD1}">
+              <a14:hiddenFill xmlns:a14="http://schemas.microsoft.com/office/drawing/2010/main">
+                <a:solidFill>
+                  <a:srgbClr val="FFFFFF"/>
+                </a:solidFill>
+              </a14:hiddenFill>
+            </a:ext>
+          </a:extLst>
+        </p:spPr>
+      </p:pic>
+      <p:sp>
+        <p:nvSpPr>
+          <p:cNvPr id="2" name="Nadpis 1"/>
+          <p:cNvSpPr>
+            <a:spLocks noGrp="1"/>
+          </p:cNvSpPr>
+          <p:nvPr>
+            <p:ph type="title"/>
+          </p:nvPr>
+        </p:nvSpPr>
+        <p:spPr>
+          <a:xfrm>
+            <a:off x="4211960" y="274638"/>
+            <a:ext cx="4474839" cy="1143000"/>
+          </a:xfrm>
+        </p:spPr>
+        <p:txBody>
+          <a:bodyPr>
+            <a:normAutofit fontScale="90000"/>
+          </a:bodyPr>
+          <a:lstStyle/>
+          <a:p>
+            <a:pPr algn="r"/>
+            <a:r>
+              <a:rPr lang="cs-CZ" dirty="0" smtClean="0"/>
+              <a:t>Kategorie produktů</a:t>
+            </a:r>
+            <a:endParaRPr lang="cs-CZ" dirty="0"/>
+          </a:p>
+        </p:txBody>
+      </p:sp>
+      <p:sp>
+        <p:nvSpPr>
+          <p:cNvPr id="3" name="Zástupný symbol pro obsah 2"/>
+          <p:cNvSpPr>
+            <a:spLocks noGrp="1"/>
+          </p:cNvSpPr>
+          <p:nvPr>
+            <p:ph idx="1"/>
+          </p:nvPr>
+        </p:nvSpPr>
+        <p:spPr>
+          <a:xfrm>
+            <a:off x="4067944" y="1600200"/>
+            <a:ext cx="4618856" cy="4525963"/>
+          </a:xfrm>
+        </p:spPr>
+        <p:txBody>
+          <a:bodyPr>
+            <a:normAutofit/>
+          </a:bodyPr>
+          <a:lstStyle/>
+          <a:p>
+            <a:r>
+              <a:rPr lang="cs-CZ" dirty="0" smtClean="0"/>
+              <a:t>Možnost procházet sortiment</a:t>
+            </a:r>
+          </a:p>
+          <a:p>
+            <a:r>
+              <a:rPr lang="cs-CZ" dirty="0" smtClean="0"/>
+              <a:t>Počty produktů</a:t>
+            </a:r>
+          </a:p>
+          <a:p>
+            <a:r>
+              <a:rPr lang="cs-CZ" dirty="0" smtClean="0"/>
+              <a:t>Načtení produktu fotoaparátem</a:t>
+            </a:r>
+          </a:p>
+          <a:p>
+            <a:pPr lvl="1"/>
+            <a:r>
+              <a:rPr lang="cs-CZ" dirty="0"/>
+              <a:t>p</a:t>
+            </a:r>
+            <a:r>
+              <a:rPr lang="cs-CZ" dirty="0" smtClean="0"/>
+              <a:t>řes čárový kód</a:t>
+            </a:r>
+          </a:p>
+          <a:p>
+            <a:r>
+              <a:rPr lang="cs-CZ" dirty="0" smtClean="0"/>
+              <a:t>Vyhledávání produktu</a:t>
+            </a:r>
+          </a:p>
+        </p:txBody>
+      </p:sp>
+    </p:spTree>
+    <p:extLst>
+      <p:ext uri="{BB962C8B-B14F-4D97-AF65-F5344CB8AC3E}">
+        <p14:creationId xmlns:p14="http://schemas.microsoft.com/office/powerpoint/2010/main" val="476001477"/>
+      </p:ext>
+    </p:extLst>
+  </p:cSld>
+  <p:clrMapOvr>
+    <a:masterClrMapping/>
+  </p:clrMapOvr>
+  <mc:AlternateContent xmlns:mc="http://schemas.openxmlformats.org/markup-compatibility/2006">
+    <mc:Choice xmlns:p14="http://schemas.microsoft.com/office/powerpoint/2010/main" Requires="p14">
+      <p:transition>
+        <p14:prism/>
+      </p:transition>
+    </mc:Choice>
+    <mc:Fallback>
+      <p:transition>
+        <p:fade/>
+      </p:transition>
+    </mc:Fallback>
+  </mc:AlternateContent>
+  <p:timing>
+    <p:tnLst>
+      <p:par>
+        <p:cTn id="1" dur="indefinite" restart="never" nodeType="tmRoot"/>
+      </p:par>
+    </p:tnLst>
+  </p:timing>
+</p:sld>
+</file>
+
+<file path=ppt/slides/slide16.xml><?xml version="1.0" encoding="utf-8"?>
+<p:sld xmlns:a="http://schemas.openxmlformats.org/drawingml/2006/main" xmlns:r="http://schemas.openxmlformats.org/officeDocument/2006/relationships" xmlns:p="http://schemas.openxmlformats.org/presentationml/2006/main">
+  <p:cSld>
+    <p:spTree>
+      <p:nvGrpSpPr>
+        <p:cNvPr id="1" name=""/>
+        <p:cNvGrpSpPr/>
+        <p:nvPr/>
+      </p:nvGrpSpPr>
+      <p:grpSpPr>
+        <a:xfrm>
+          <a:off x="0" y="0"/>
+          <a:ext cx="0" cy="0"/>
+          <a:chOff x="0" y="0"/>
+          <a:chExt cx="0" cy="0"/>
+        </a:xfrm>
+      </p:grpSpPr>
+      <p:pic>
+        <p:nvPicPr>
+          <p:cNvPr id="1026" name="Picture 2"/>
+          <p:cNvPicPr>
+            <a:picLocks noChangeAspect="1" noChangeArrowheads="1"/>
+          </p:cNvPicPr>
+          <p:nvPr/>
+        </p:nvPicPr>
+        <p:blipFill>
+          <a:blip r:embed="rId2">
+            <a:extLst>
+              <a:ext uri="{28A0092B-C50C-407E-A947-70E740481C1C}">
+                <a14:useLocalDpi xmlns:a14="http://schemas.microsoft.com/office/drawing/2010/main" val="0"/>
+              </a:ext>
+            </a:extLst>
+          </a:blip>
+          <a:stretch>
+            <a:fillRect/>
+          </a:stretch>
+        </p:blipFill>
+        <p:spPr bwMode="auto">
+          <a:xfrm>
+            <a:off x="0" y="-10953"/>
+            <a:ext cx="3795174" cy="6868953"/>
+          </a:xfrm>
+          <a:prstGeom prst="rect">
+            <a:avLst/>
+          </a:prstGeom>
+          <a:noFill/>
+          <a:extLst>
+            <a:ext uri="{909E8E84-426E-40DD-AFC4-6F175D3DCCD1}">
+              <a14:hiddenFill xmlns:a14="http://schemas.microsoft.com/office/drawing/2010/main">
+                <a:solidFill>
+                  <a:srgbClr val="FFFFFF"/>
+                </a:solidFill>
+              </a14:hiddenFill>
+            </a:ext>
+          </a:extLst>
+        </p:spPr>
+      </p:pic>
+      <p:sp>
+        <p:nvSpPr>
+          <p:cNvPr id="2" name="Nadpis 1"/>
+          <p:cNvSpPr>
+            <a:spLocks noGrp="1"/>
+          </p:cNvSpPr>
+          <p:nvPr>
+            <p:ph type="title"/>
+          </p:nvPr>
+        </p:nvSpPr>
+        <p:spPr>
+          <a:xfrm>
+            <a:off x="4211960" y="274638"/>
+            <a:ext cx="4474839" cy="1143000"/>
+          </a:xfrm>
+        </p:spPr>
+        <p:txBody>
+          <a:bodyPr>
+            <a:normAutofit fontScale="90000"/>
+          </a:bodyPr>
+          <a:lstStyle/>
+          <a:p>
+            <a:pPr algn="r"/>
+            <a:r>
+              <a:rPr lang="cs-CZ" dirty="0" smtClean="0"/>
+              <a:t>Produkty kategorie</a:t>
+            </a:r>
+            <a:endParaRPr lang="cs-CZ" dirty="0"/>
+          </a:p>
+        </p:txBody>
+      </p:sp>
+      <p:sp>
+        <p:nvSpPr>
+          <p:cNvPr id="3" name="Zástupný symbol pro obsah 2"/>
+          <p:cNvSpPr>
+            <a:spLocks noGrp="1"/>
+          </p:cNvSpPr>
+          <p:nvPr>
+            <p:ph idx="1"/>
+          </p:nvPr>
+        </p:nvSpPr>
+        <p:spPr>
+          <a:xfrm>
+            <a:off x="4067944" y="1600200"/>
+            <a:ext cx="4618856" cy="4525963"/>
+          </a:xfrm>
+        </p:spPr>
+        <p:txBody>
+          <a:bodyPr>
+            <a:normAutofit/>
+          </a:bodyPr>
+          <a:lstStyle/>
+          <a:p>
+            <a:r>
+              <a:rPr lang="cs-CZ" dirty="0" smtClean="0"/>
+              <a:t>Přehledný seznam</a:t>
+            </a:r>
+          </a:p>
+          <a:p>
+            <a:r>
+              <a:rPr lang="cs-CZ" dirty="0" smtClean="0"/>
+              <a:t>Řazení dle vhodnosti</a:t>
+            </a:r>
+          </a:p>
+          <a:p>
+            <a:r>
+              <a:rPr lang="cs-CZ" dirty="0" smtClean="0"/>
+              <a:t>Ceny produktů</a:t>
+            </a:r>
+          </a:p>
+          <a:p>
+            <a:r>
+              <a:rPr lang="cs-CZ" dirty="0" smtClean="0"/>
+              <a:t>Intuitivní obrázky</a:t>
+            </a:r>
+          </a:p>
+        </p:txBody>
+      </p:sp>
+    </p:spTree>
+    <p:extLst>
+      <p:ext uri="{BB962C8B-B14F-4D97-AF65-F5344CB8AC3E}">
+        <p14:creationId xmlns:p14="http://schemas.microsoft.com/office/powerpoint/2010/main" val="2916430422"/>
+      </p:ext>
+    </p:extLst>
+  </p:cSld>
+  <p:clrMapOvr>
+    <a:masterClrMapping/>
+  </p:clrMapOvr>
+  <mc:AlternateContent xmlns:mc="http://schemas.openxmlformats.org/markup-compatibility/2006">
+    <mc:Choice xmlns:p14="http://schemas.microsoft.com/office/powerpoint/2010/main" Requires="p14">
+      <p:transition>
+        <p14:prism/>
+      </p:transition>
+    </mc:Choice>
+    <mc:Fallback>
+      <p:transition>
+        <p:fade/>
+      </p:transition>
+    </mc:Fallback>
+  </mc:AlternateContent>
+  <p:timing>
+    <p:tnLst>
+      <p:par>
+        <p:cTn id="1" dur="indefinite" restart="never" nodeType="tmRoot"/>
+      </p:par>
+    </p:tnLst>
+  </p:timing>
+</p:sld>
+</file>
+
+<file path=ppt/slides/slide17.xml><?xml version="1.0" encoding="utf-8"?>
+<p:sld xmlns:a="http://schemas.openxmlformats.org/drawingml/2006/main" xmlns:r="http://schemas.openxmlformats.org/officeDocument/2006/relationships" xmlns:p="http://schemas.openxmlformats.org/presentationml/2006/main">
+  <p:cSld>
+    <p:spTree>
+      <p:nvGrpSpPr>
+        <p:cNvPr id="1" name=""/>
+        <p:cNvGrpSpPr/>
+        <p:nvPr/>
+      </p:nvGrpSpPr>
+      <p:grpSpPr>
+        <a:xfrm>
+          <a:off x="0" y="0"/>
+          <a:ext cx="0" cy="0"/>
+          <a:chOff x="0" y="0"/>
+          <a:chExt cx="0" cy="0"/>
+        </a:xfrm>
+      </p:grpSpPr>
+      <p:pic>
+        <p:nvPicPr>
+          <p:cNvPr id="1026" name="Picture 2"/>
+          <p:cNvPicPr>
+            <a:picLocks noChangeAspect="1" noChangeArrowheads="1"/>
+          </p:cNvPicPr>
+          <p:nvPr/>
+        </p:nvPicPr>
+        <p:blipFill>
+          <a:blip r:embed="rId2">
+            <a:extLst>
+              <a:ext uri="{28A0092B-C50C-407E-A947-70E740481C1C}">
+                <a14:useLocalDpi xmlns:a14="http://schemas.microsoft.com/office/drawing/2010/main" val="0"/>
+              </a:ext>
+            </a:extLst>
+          </a:blip>
+          <a:stretch>
+            <a:fillRect/>
+          </a:stretch>
+        </p:blipFill>
+        <p:spPr bwMode="auto">
+          <a:xfrm>
+            <a:off x="0" y="-10953"/>
+            <a:ext cx="3795174" cy="6868953"/>
+          </a:xfrm>
+          <a:prstGeom prst="rect">
+            <a:avLst/>
+          </a:prstGeom>
+          <a:noFill/>
+          <a:extLst>
+            <a:ext uri="{909E8E84-426E-40DD-AFC4-6F175D3DCCD1}">
+              <a14:hiddenFill xmlns:a14="http://schemas.microsoft.com/office/drawing/2010/main">
+                <a:solidFill>
+                  <a:srgbClr val="FFFFFF"/>
+                </a:solidFill>
+              </a14:hiddenFill>
+            </a:ext>
+          </a:extLst>
+        </p:spPr>
+      </p:pic>
+      <p:sp>
+        <p:nvSpPr>
+          <p:cNvPr id="2" name="Nadpis 1"/>
+          <p:cNvSpPr>
+            <a:spLocks noGrp="1"/>
+          </p:cNvSpPr>
+          <p:nvPr>
+            <p:ph type="title"/>
+          </p:nvPr>
+        </p:nvSpPr>
+        <p:spPr>
+          <a:xfrm>
+            <a:off x="4211960" y="274638"/>
+            <a:ext cx="4474839" cy="1143000"/>
+          </a:xfrm>
+        </p:spPr>
+        <p:txBody>
+          <a:bodyPr>
+            <a:normAutofit/>
+          </a:bodyPr>
+          <a:lstStyle/>
+          <a:p>
+            <a:pPr algn="r"/>
+            <a:r>
+              <a:rPr lang="cs-CZ" dirty="0" smtClean="0"/>
+              <a:t>Produkt</a:t>
+            </a:r>
+            <a:endParaRPr lang="cs-CZ" dirty="0"/>
+          </a:p>
+        </p:txBody>
+      </p:sp>
+      <p:sp>
+        <p:nvSpPr>
+          <p:cNvPr id="3" name="Zástupný symbol pro obsah 2"/>
+          <p:cNvSpPr>
+            <a:spLocks noGrp="1"/>
+          </p:cNvSpPr>
+          <p:nvPr>
+            <p:ph idx="1"/>
+          </p:nvPr>
+        </p:nvSpPr>
+        <p:spPr>
+          <a:xfrm>
+            <a:off x="4067944" y="1600200"/>
+            <a:ext cx="4618856" cy="4525963"/>
+          </a:xfrm>
+        </p:spPr>
+        <p:txBody>
+          <a:bodyPr>
+            <a:normAutofit/>
+          </a:bodyPr>
+          <a:lstStyle/>
+          <a:p>
+            <a:r>
+              <a:rPr lang="cs-CZ" dirty="0" smtClean="0"/>
+              <a:t>Popis produktu</a:t>
+            </a:r>
+          </a:p>
+          <a:p>
+            <a:r>
+              <a:rPr lang="cs-CZ" dirty="0" smtClean="0"/>
+              <a:t>Soc. informace</a:t>
+            </a:r>
+          </a:p>
+          <a:p>
+            <a:r>
+              <a:rPr lang="cs-CZ" dirty="0" smtClean="0"/>
+              <a:t>Pozice produktu v obchodě</a:t>
+            </a:r>
+          </a:p>
+          <a:p>
+            <a:r>
+              <a:rPr lang="cs-CZ" dirty="0" smtClean="0"/>
+              <a:t>Žádost o smlouvání ceny</a:t>
+            </a:r>
+          </a:p>
+        </p:txBody>
+      </p:sp>
+    </p:spTree>
+    <p:extLst>
+      <p:ext uri="{BB962C8B-B14F-4D97-AF65-F5344CB8AC3E}">
+        <p14:creationId xmlns:p14="http://schemas.microsoft.com/office/powerpoint/2010/main" val="2942689820"/>
+      </p:ext>
+    </p:extLst>
+  </p:cSld>
+  <p:clrMapOvr>
+    <a:masterClrMapping/>
+  </p:clrMapOvr>
+  <mc:AlternateContent xmlns:mc="http://schemas.openxmlformats.org/markup-compatibility/2006">
+    <mc:Choice xmlns:p14="http://schemas.microsoft.com/office/powerpoint/2010/main" Requires="p14">
+      <p:transition>
+        <p14:prism/>
+      </p:transition>
+    </mc:Choice>
+    <mc:Fallback>
+      <p:transition>
+        <p:fade/>
+      </p:transition>
+    </mc:Fallback>
+  </mc:AlternateContent>
+  <p:timing>
+    <p:tnLst>
+      <p:par>
+        <p:cTn id="1" dur="indefinite" restart="never" nodeType="tmRoot"/>
+      </p:par>
+    </p:tnLst>
+  </p:timing>
+</p:sld>
+</file>
+
+<file path=ppt/slides/slide18.xml><?xml version="1.0" encoding="utf-8"?>
+<p:sld xmlns:a="http://schemas.openxmlformats.org/drawingml/2006/main" xmlns:r="http://schemas.openxmlformats.org/officeDocument/2006/relationships" xmlns:p="http://schemas.openxmlformats.org/presentationml/2006/main">
+  <p:cSld>
+    <p:spTree>
+      <p:nvGrpSpPr>
+        <p:cNvPr id="1" name=""/>
+        <p:cNvGrpSpPr/>
+        <p:nvPr/>
+      </p:nvGrpSpPr>
+      <p:grpSpPr>
+        <a:xfrm>
+          <a:off x="0" y="0"/>
+          <a:ext cx="0" cy="0"/>
+          <a:chOff x="0" y="0"/>
+          <a:chExt cx="0" cy="0"/>
+        </a:xfrm>
+      </p:grpSpPr>
+      <p:pic>
+        <p:nvPicPr>
+          <p:cNvPr id="1026" name="Picture 2"/>
+          <p:cNvPicPr>
+            <a:picLocks noChangeAspect="1" noChangeArrowheads="1"/>
+          </p:cNvPicPr>
+          <p:nvPr/>
+        </p:nvPicPr>
+        <p:blipFill>
+          <a:blip r:embed="rId2">
+            <a:extLst>
+              <a:ext uri="{28A0092B-C50C-407E-A947-70E740481C1C}">
+                <a14:useLocalDpi xmlns:a14="http://schemas.microsoft.com/office/drawing/2010/main" val="0"/>
+              </a:ext>
+            </a:extLst>
+          </a:blip>
+          <a:stretch>
+            <a:fillRect/>
+          </a:stretch>
+        </p:blipFill>
+        <p:spPr bwMode="auto">
+          <a:xfrm>
+            <a:off x="0" y="-10953"/>
+            <a:ext cx="3795174" cy="6868953"/>
+          </a:xfrm>
+          <a:prstGeom prst="rect">
+            <a:avLst/>
+          </a:prstGeom>
+          <a:noFill/>
+          <a:extLst>
+            <a:ext uri="{909E8E84-426E-40DD-AFC4-6F175D3DCCD1}">
+              <a14:hiddenFill xmlns:a14="http://schemas.microsoft.com/office/drawing/2010/main">
+                <a:solidFill>
+                  <a:srgbClr val="FFFFFF"/>
+                </a:solidFill>
+              </a14:hiddenFill>
+            </a:ext>
+          </a:extLst>
+        </p:spPr>
+      </p:pic>
+      <p:sp>
+        <p:nvSpPr>
+          <p:cNvPr id="2" name="Nadpis 1"/>
+          <p:cNvSpPr>
+            <a:spLocks noGrp="1"/>
+          </p:cNvSpPr>
+          <p:nvPr>
+            <p:ph type="title"/>
+          </p:nvPr>
+        </p:nvSpPr>
+        <p:spPr>
+          <a:xfrm>
+            <a:off x="4211960" y="274638"/>
+            <a:ext cx="4474839" cy="1143000"/>
+          </a:xfrm>
+        </p:spPr>
+        <p:txBody>
+          <a:bodyPr>
+            <a:normAutofit/>
+          </a:bodyPr>
+          <a:lstStyle/>
+          <a:p>
+            <a:pPr algn="r"/>
+            <a:r>
+              <a:rPr lang="cs-CZ" dirty="0" smtClean="0"/>
+              <a:t>Smlouvání</a:t>
+            </a:r>
+            <a:endParaRPr lang="cs-CZ" dirty="0"/>
+          </a:p>
+        </p:txBody>
+      </p:sp>
+      <p:sp>
+        <p:nvSpPr>
+          <p:cNvPr id="3" name="Zástupný symbol pro obsah 2"/>
+          <p:cNvSpPr>
+            <a:spLocks noGrp="1"/>
+          </p:cNvSpPr>
+          <p:nvPr>
+            <p:ph idx="1"/>
+          </p:nvPr>
+        </p:nvSpPr>
+        <p:spPr>
+          <a:xfrm>
+            <a:off x="4067944" y="1600200"/>
+            <a:ext cx="4618856" cy="4525963"/>
+          </a:xfrm>
+        </p:spPr>
+        <p:txBody>
+          <a:bodyPr>
+            <a:normAutofit/>
+          </a:bodyPr>
+          <a:lstStyle/>
+          <a:p>
+            <a:r>
+              <a:rPr lang="cs-CZ" dirty="0" smtClean="0"/>
+              <a:t>Stanovení podmínek pro získání slevy</a:t>
+            </a:r>
+          </a:p>
+        </p:txBody>
+      </p:sp>
+    </p:spTree>
+    <p:extLst>
+      <p:ext uri="{BB962C8B-B14F-4D97-AF65-F5344CB8AC3E}">
+        <p14:creationId xmlns:p14="http://schemas.microsoft.com/office/powerpoint/2010/main" val="3659224038"/>
+      </p:ext>
+    </p:extLst>
+  </p:cSld>
+  <p:clrMapOvr>
+    <a:masterClrMapping/>
+  </p:clrMapOvr>
+  <mc:AlternateContent xmlns:mc="http://schemas.openxmlformats.org/markup-compatibility/2006">
+    <mc:Choice xmlns:p14="http://schemas.microsoft.com/office/powerpoint/2010/main" Requires="p14">
+      <p:transition>
+        <p14:prism/>
+      </p:transition>
+    </mc:Choice>
+    <mc:Fallback>
+      <p:transition>
+        <p:fade/>
+      </p:transition>
+    </mc:Fallback>
+  </mc:AlternateContent>
+  <p:timing>
+    <p:tnLst>
+      <p:par>
+        <p:cTn id="1" dur="indefinite" restart="never" nodeType="tmRoot"/>
+      </p:par>
+    </p:tnLst>
+  </p:timing>
+</p:sld>
+</file>
+
+<file path=ppt/slides/slide19.xml><?xml version="1.0" encoding="utf-8"?>
+<p:sld xmlns:a="http://schemas.openxmlformats.org/drawingml/2006/main" xmlns:r="http://schemas.openxmlformats.org/officeDocument/2006/relationships" xmlns:p="http://schemas.openxmlformats.org/presentationml/2006/main">
+  <p:cSld>
+    <p:spTree>
+      <p:nvGrpSpPr>
+        <p:cNvPr id="1" name=""/>
+        <p:cNvGrpSpPr/>
+        <p:nvPr/>
+      </p:nvGrpSpPr>
+      <p:grpSpPr>
+        <a:xfrm>
+          <a:off x="0" y="0"/>
+          <a:ext cx="0" cy="0"/>
+          <a:chOff x="0" y="0"/>
+          <a:chExt cx="0" cy="0"/>
+        </a:xfrm>
+      </p:grpSpPr>
+      <p:pic>
+        <p:nvPicPr>
+          <p:cNvPr id="1026" name="Picture 2"/>
+          <p:cNvPicPr>
+            <a:picLocks noChangeAspect="1" noChangeArrowheads="1"/>
+          </p:cNvPicPr>
+          <p:nvPr/>
+        </p:nvPicPr>
+        <p:blipFill>
+          <a:blip r:embed="rId2">
+            <a:extLst>
+              <a:ext uri="{28A0092B-C50C-407E-A947-70E740481C1C}">
+                <a14:useLocalDpi xmlns:a14="http://schemas.microsoft.com/office/drawing/2010/main" val="0"/>
+              </a:ext>
+            </a:extLst>
+          </a:blip>
+          <a:stretch>
+            <a:fillRect/>
+          </a:stretch>
+        </p:blipFill>
+        <p:spPr bwMode="auto">
+          <a:xfrm>
+            <a:off x="0" y="-10953"/>
+            <a:ext cx="3795174" cy="6868953"/>
+          </a:xfrm>
+          <a:prstGeom prst="rect">
+            <a:avLst/>
+          </a:prstGeom>
+          <a:noFill/>
+          <a:extLst>
+            <a:ext uri="{909E8E84-426E-40DD-AFC4-6F175D3DCCD1}">
+              <a14:hiddenFill xmlns:a14="http://schemas.microsoft.com/office/drawing/2010/main">
+                <a:solidFill>
+                  <a:srgbClr val="FFFFFF"/>
+                </a:solidFill>
+              </a14:hiddenFill>
+            </a:ext>
+          </a:extLst>
+        </p:spPr>
+      </p:pic>
+      <p:sp>
+        <p:nvSpPr>
+          <p:cNvPr id="2" name="Nadpis 1"/>
+          <p:cNvSpPr>
+            <a:spLocks noGrp="1"/>
+          </p:cNvSpPr>
+          <p:nvPr>
+            <p:ph type="title"/>
+          </p:nvPr>
+        </p:nvSpPr>
+        <p:spPr>
+          <a:xfrm>
+            <a:off x="4211960" y="274638"/>
+            <a:ext cx="4474839" cy="1143000"/>
+          </a:xfrm>
+        </p:spPr>
+        <p:txBody>
+          <a:bodyPr>
+            <a:normAutofit fontScale="90000"/>
+          </a:bodyPr>
+          <a:lstStyle/>
+          <a:p>
+            <a:pPr algn="r"/>
+            <a:r>
+              <a:rPr lang="cs-CZ" dirty="0" smtClean="0"/>
+              <a:t>Uživatelské skupiny</a:t>
+            </a:r>
+            <a:endParaRPr lang="cs-CZ" dirty="0"/>
+          </a:p>
+        </p:txBody>
+      </p:sp>
+      <p:sp>
+        <p:nvSpPr>
+          <p:cNvPr id="3" name="Zástupný symbol pro obsah 2"/>
+          <p:cNvSpPr>
+            <a:spLocks noGrp="1"/>
+          </p:cNvSpPr>
+          <p:nvPr>
+            <p:ph idx="1"/>
+          </p:nvPr>
+        </p:nvSpPr>
+        <p:spPr>
+          <a:xfrm>
+            <a:off x="4067944" y="1600200"/>
+            <a:ext cx="4618856" cy="4525963"/>
+          </a:xfrm>
+        </p:spPr>
+        <p:txBody>
+          <a:bodyPr>
+            <a:normAutofit/>
+          </a:bodyPr>
+          <a:lstStyle/>
+          <a:p>
+            <a:r>
+              <a:rPr lang="cs-CZ" dirty="0" smtClean="0"/>
+              <a:t>Věrnostní body</a:t>
+            </a:r>
+          </a:p>
+          <a:p>
+            <a:r>
+              <a:rPr lang="cs-CZ" dirty="0" smtClean="0"/>
+              <a:t>Věrnostní status</a:t>
+            </a:r>
+          </a:p>
+          <a:p>
+            <a:r>
+              <a:rPr lang="cs-CZ" dirty="0" smtClean="0"/>
+              <a:t>QR kód skupiny</a:t>
+            </a:r>
+          </a:p>
+          <a:p>
+            <a:r>
+              <a:rPr lang="cs-CZ" dirty="0" smtClean="0"/>
+              <a:t>Členové skupiny</a:t>
+            </a:r>
+          </a:p>
+          <a:p>
+            <a:r>
+              <a:rPr lang="cs-CZ" dirty="0" smtClean="0"/>
+              <a:t>Nákupy</a:t>
+            </a:r>
+          </a:p>
+        </p:txBody>
+      </p:sp>
+    </p:spTree>
+    <p:extLst>
+      <p:ext uri="{BB962C8B-B14F-4D97-AF65-F5344CB8AC3E}">
+        <p14:creationId xmlns:p14="http://schemas.microsoft.com/office/powerpoint/2010/main" val="761911855"/>
+      </p:ext>
+    </p:extLst>
+  </p:cSld>
+  <p:clrMapOvr>
+    <a:masterClrMapping/>
+  </p:clrMapOvr>
+  <mc:AlternateContent xmlns:mc="http://schemas.openxmlformats.org/markup-compatibility/2006">
+    <mc:Choice xmlns:p14="http://schemas.microsoft.com/office/powerpoint/2010/main" Requires="p14">
+      <p:transition>
+        <p14:prism/>
+      </p:transition>
+    </mc:Choice>
+    <mc:Fallback>
+      <p:transition>
+        <p:fade/>
+      </p:transition>
+    </mc:Fallback>
+  </mc:AlternateContent>
+  <p:timing>
+    <p:tnLst>
+      <p:par>
+        <p:cTn id="1" dur="indefinite" restart="never" nodeType="tmRoot"/>
+      </p:par>
+    </p:tnLst>
+  </p:timing>
 </p:sld>
 </file>
 
@@ -3176,6 +5053,47 @@
           <a:chExt cx="0" cy="0"/>
         </a:xfrm>
       </p:grpSpPr>
+      <p:pic>
+        <p:nvPicPr>
+          <p:cNvPr id="1026" name="Picture 2" descr="C:\Users\Michael\Work\Programing\eclipse\myRetail\diagrams\mockups\images\Login.jpg"/>
+          <p:cNvPicPr>
+            <a:picLocks noChangeAspect="1" noChangeArrowheads="1"/>
+          </p:cNvPicPr>
+          <p:nvPr/>
+        </p:nvPicPr>
+        <p:blipFill>
+          <a:blip r:embed="rId2">
+            <a:extLst>
+              <a:ext uri="{28A0092B-C50C-407E-A947-70E740481C1C}">
+                <a14:useLocalDpi xmlns:a14="http://schemas.microsoft.com/office/drawing/2010/main" val="0"/>
+              </a:ext>
+            </a:extLst>
+          </a:blip>
+          <a:srcRect/>
+          <a:stretch>
+            <a:fillRect/>
+          </a:stretch>
+        </p:blipFill>
+        <p:spPr bwMode="auto">
+          <a:xfrm>
+            <a:off x="0" y="-10953"/>
+            <a:ext cx="3795175" cy="6868953"/>
+          </a:xfrm>
+          <a:prstGeom prst="rect">
+            <a:avLst/>
+          </a:prstGeom>
+          <a:noFill/>
+          <a:extLst>
+            <a:ext uri="{909E8E84-426E-40DD-AFC4-6F175D3DCCD1}">
+              <a14:hiddenFill xmlns:a14="http://schemas.microsoft.com/office/drawing/2010/main">
+                <a:solidFill>
+                  <a:srgbClr val="FFFFFF"/>
+                </a:solidFill>
+              </a14:hiddenFill>
+            </a:ext>
+          </a:extLst>
+        </p:spPr>
+      </p:pic>
       <p:sp>
         <p:nvSpPr>
           <p:cNvPr id="2" name="Nadpis 1"/>
@@ -3186,11 +5104,17 @@
             <p:ph type="title"/>
           </p:nvPr>
         </p:nvSpPr>
-        <p:spPr/>
+        <p:spPr>
+          <a:xfrm>
+            <a:off x="4211960" y="274638"/>
+            <a:ext cx="4474839" cy="1143000"/>
+          </a:xfrm>
+        </p:spPr>
         <p:txBody>
           <a:bodyPr/>
           <a:lstStyle/>
           <a:p>
+            <a:pPr algn="r"/>
             <a:r>
               <a:rPr lang="cs-CZ" dirty="0" smtClean="0"/>
               <a:t>Přihlášení k účtu</a:t>
@@ -3209,11 +5133,68 @@
             <p:ph idx="1"/>
           </p:nvPr>
         </p:nvSpPr>
-        <p:spPr/>
+        <p:spPr>
+          <a:xfrm>
+            <a:off x="4067944" y="1600200"/>
+            <a:ext cx="4618856" cy="4525963"/>
+          </a:xfrm>
+        </p:spPr>
         <p:txBody>
           <a:bodyPr/>
           <a:lstStyle/>
           <a:p>
+            <a:r>
+              <a:rPr lang="cs-CZ" dirty="0" smtClean="0"/>
+              <a:t>První přihlášení</a:t>
+            </a:r>
+          </a:p>
+          <a:p>
+            <a:r>
+              <a:rPr lang="cs-CZ" dirty="0" smtClean="0"/>
+              <a:t>FB přihlášení</a:t>
+            </a:r>
+          </a:p>
+          <a:p>
+            <a:endParaRPr lang="cs-CZ" dirty="0" smtClean="0"/>
+          </a:p>
+          <a:p>
+            <a:r>
+              <a:rPr lang="cs-CZ" dirty="0" smtClean="0"/>
+              <a:t>Přístup přes:</a:t>
+            </a:r>
+          </a:p>
+          <a:p>
+            <a:pPr lvl="1"/>
+            <a:r>
+              <a:rPr lang="cs-CZ" dirty="0" smtClean="0"/>
+              <a:t>www</a:t>
+            </a:r>
+          </a:p>
+          <a:p>
+            <a:pPr lvl="1"/>
+            <a:r>
+              <a:rPr lang="cs-CZ" dirty="0" smtClean="0"/>
+              <a:t>Android</a:t>
+            </a:r>
+          </a:p>
+          <a:p>
+            <a:pPr lvl="1"/>
+            <a:r>
+              <a:rPr lang="cs-CZ" dirty="0" err="1" smtClean="0"/>
+              <a:t>iOS</a:t>
+            </a:r>
+            <a:endParaRPr lang="cs-CZ" dirty="0" smtClean="0"/>
+          </a:p>
+          <a:p>
+            <a:pPr lvl="1"/>
+            <a:r>
+              <a:rPr lang="cs-CZ" dirty="0"/>
+              <a:t>a</a:t>
+            </a:r>
+            <a:r>
+              <a:rPr lang="cs-CZ" dirty="0" smtClean="0"/>
+              <a:t> další…</a:t>
+            </a:r>
             <a:endParaRPr lang="cs-CZ" dirty="0"/>
           </a:p>
         </p:txBody>
@@ -3228,6 +5209,1893 @@
   <p:clrMapOvr>
     <a:masterClrMapping/>
   </p:clrMapOvr>
+  <mc:AlternateContent xmlns:mc="http://schemas.openxmlformats.org/markup-compatibility/2006">
+    <mc:Choice xmlns:p14="http://schemas.microsoft.com/office/powerpoint/2010/main" Requires="p14">
+      <p:transition>
+        <p14:prism/>
+      </p:transition>
+    </mc:Choice>
+    <mc:Fallback>
+      <p:transition>
+        <p:fade/>
+      </p:transition>
+    </mc:Fallback>
+  </mc:AlternateContent>
+  <p:timing>
+    <p:tnLst>
+      <p:par>
+        <p:cTn id="1" dur="indefinite" restart="never" nodeType="tmRoot"/>
+      </p:par>
+    </p:tnLst>
+  </p:timing>
+</p:sld>
+</file>
+
+<file path=ppt/slides/slide20.xml><?xml version="1.0" encoding="utf-8"?>
+<p:sld xmlns:a="http://schemas.openxmlformats.org/drawingml/2006/main" xmlns:r="http://schemas.openxmlformats.org/officeDocument/2006/relationships" xmlns:p="http://schemas.openxmlformats.org/presentationml/2006/main">
+  <p:cSld>
+    <p:spTree>
+      <p:nvGrpSpPr>
+        <p:cNvPr id="1" name=""/>
+        <p:cNvGrpSpPr/>
+        <p:nvPr/>
+      </p:nvGrpSpPr>
+      <p:grpSpPr>
+        <a:xfrm>
+          <a:off x="0" y="0"/>
+          <a:ext cx="0" cy="0"/>
+          <a:chOff x="0" y="0"/>
+          <a:chExt cx="0" cy="0"/>
+        </a:xfrm>
+      </p:grpSpPr>
+      <p:pic>
+        <p:nvPicPr>
+          <p:cNvPr id="1026" name="Picture 2"/>
+          <p:cNvPicPr>
+            <a:picLocks noChangeAspect="1" noChangeArrowheads="1"/>
+          </p:cNvPicPr>
+          <p:nvPr/>
+        </p:nvPicPr>
+        <p:blipFill>
+          <a:blip r:embed="rId2">
+            <a:extLst>
+              <a:ext uri="{28A0092B-C50C-407E-A947-70E740481C1C}">
+                <a14:useLocalDpi xmlns:a14="http://schemas.microsoft.com/office/drawing/2010/main" val="0"/>
+              </a:ext>
+            </a:extLst>
+          </a:blip>
+          <a:stretch>
+            <a:fillRect/>
+          </a:stretch>
+        </p:blipFill>
+        <p:spPr bwMode="auto">
+          <a:xfrm>
+            <a:off x="0" y="-10953"/>
+            <a:ext cx="3795174" cy="6868953"/>
+          </a:xfrm>
+          <a:prstGeom prst="rect">
+            <a:avLst/>
+          </a:prstGeom>
+          <a:noFill/>
+          <a:extLst>
+            <a:ext uri="{909E8E84-426E-40DD-AFC4-6F175D3DCCD1}">
+              <a14:hiddenFill xmlns:a14="http://schemas.microsoft.com/office/drawing/2010/main">
+                <a:solidFill>
+                  <a:srgbClr val="FFFFFF"/>
+                </a:solidFill>
+              </a14:hiddenFill>
+            </a:ext>
+          </a:extLst>
+        </p:spPr>
+      </p:pic>
+      <p:sp>
+        <p:nvSpPr>
+          <p:cNvPr id="2" name="Nadpis 1"/>
+          <p:cNvSpPr>
+            <a:spLocks noGrp="1"/>
+          </p:cNvSpPr>
+          <p:nvPr>
+            <p:ph type="title"/>
+          </p:nvPr>
+        </p:nvSpPr>
+        <p:spPr>
+          <a:xfrm>
+            <a:off x="4211960" y="274638"/>
+            <a:ext cx="4474839" cy="1143000"/>
+          </a:xfrm>
+        </p:spPr>
+        <p:txBody>
+          <a:bodyPr>
+            <a:normAutofit/>
+          </a:bodyPr>
+          <a:lstStyle/>
+          <a:p>
+            <a:pPr algn="r"/>
+            <a:r>
+              <a:rPr lang="cs-CZ" dirty="0" smtClean="0"/>
+              <a:t>Nastavení aplikace</a:t>
+            </a:r>
+            <a:endParaRPr lang="cs-CZ" dirty="0"/>
+          </a:p>
+        </p:txBody>
+      </p:sp>
+      <p:sp>
+        <p:nvSpPr>
+          <p:cNvPr id="3" name="Zástupný symbol pro obsah 2"/>
+          <p:cNvSpPr>
+            <a:spLocks noGrp="1"/>
+          </p:cNvSpPr>
+          <p:nvPr>
+            <p:ph idx="1"/>
+          </p:nvPr>
+        </p:nvSpPr>
+        <p:spPr>
+          <a:xfrm>
+            <a:off x="4067944" y="1600200"/>
+            <a:ext cx="4618856" cy="4525963"/>
+          </a:xfrm>
+        </p:spPr>
+        <p:txBody>
+          <a:bodyPr>
+            <a:normAutofit/>
+          </a:bodyPr>
+          <a:lstStyle/>
+          <a:p>
+            <a:r>
+              <a:rPr lang="cs-CZ" dirty="0" smtClean="0"/>
+              <a:t>Upozornění</a:t>
+            </a:r>
+          </a:p>
+          <a:p>
+            <a:pPr lvl="1"/>
+            <a:r>
+              <a:rPr lang="cs-CZ" dirty="0" smtClean="0"/>
+              <a:t>Zvukové, vibrace, světelné, v oznamovací oblasti</a:t>
+            </a:r>
+          </a:p>
+          <a:p>
+            <a:r>
+              <a:rPr lang="cs-CZ" dirty="0" smtClean="0"/>
+              <a:t>Identifikace zákazníka</a:t>
+            </a:r>
+          </a:p>
+          <a:p>
+            <a:pPr lvl="1"/>
+            <a:r>
+              <a:rPr lang="cs-CZ" dirty="0" err="1" smtClean="0"/>
+              <a:t>Bluetooth</a:t>
+            </a:r>
+            <a:r>
+              <a:rPr lang="cs-CZ" dirty="0" smtClean="0"/>
+              <a:t>, </a:t>
+            </a:r>
+            <a:r>
+              <a:rPr lang="cs-CZ" dirty="0" err="1" smtClean="0"/>
+              <a:t>WiFi</a:t>
+            </a:r>
+            <a:r>
+              <a:rPr lang="cs-CZ" dirty="0" smtClean="0"/>
+              <a:t>, GPS, BTS (antény)</a:t>
+            </a:r>
+          </a:p>
+        </p:txBody>
+      </p:sp>
+    </p:spTree>
+    <p:extLst>
+      <p:ext uri="{BB962C8B-B14F-4D97-AF65-F5344CB8AC3E}">
+        <p14:creationId xmlns:p14="http://schemas.microsoft.com/office/powerpoint/2010/main" val="2809942346"/>
+      </p:ext>
+    </p:extLst>
+  </p:cSld>
+  <p:clrMapOvr>
+    <a:masterClrMapping/>
+  </p:clrMapOvr>
+  <mc:AlternateContent xmlns:mc="http://schemas.openxmlformats.org/markup-compatibility/2006">
+    <mc:Choice xmlns:p14="http://schemas.microsoft.com/office/powerpoint/2010/main" Requires="p14">
+      <p:transition>
+        <p14:prism/>
+      </p:transition>
+    </mc:Choice>
+    <mc:Fallback>
+      <p:transition>
+        <p:fade/>
+      </p:transition>
+    </mc:Fallback>
+  </mc:AlternateContent>
+  <p:timing>
+    <p:tnLst>
+      <p:par>
+        <p:cTn id="1" dur="indefinite" restart="never" nodeType="tmRoot"/>
+      </p:par>
+    </p:tnLst>
+  </p:timing>
+</p:sld>
+</file>
+
+<file path=ppt/slides/slide21.xml><?xml version="1.0" encoding="utf-8"?>
+<p:sld xmlns:a="http://schemas.openxmlformats.org/drawingml/2006/main" xmlns:r="http://schemas.openxmlformats.org/officeDocument/2006/relationships" xmlns:p="http://schemas.openxmlformats.org/presentationml/2006/main">
+  <p:cSld>
+    <p:bg>
+      <p:bgPr>
+        <a:blipFill dpi="0" rotWithShape="1">
+          <a:blip r:embed="rId2">
+            <a:lum/>
+          </a:blip>
+          <a:srcRect/>
+          <a:stretch>
+            <a:fillRect/>
+          </a:stretch>
+        </a:blipFill>
+        <a:effectLst/>
+      </p:bgPr>
+    </p:bg>
+    <p:spTree>
+      <p:nvGrpSpPr>
+        <p:cNvPr id="1" name=""/>
+        <p:cNvGrpSpPr/>
+        <p:nvPr/>
+      </p:nvGrpSpPr>
+      <p:grpSpPr>
+        <a:xfrm>
+          <a:off x="0" y="0"/>
+          <a:ext cx="0" cy="0"/>
+          <a:chOff x="0" y="0"/>
+          <a:chExt cx="0" cy="0"/>
+        </a:xfrm>
+      </p:grpSpPr>
+      <p:sp>
+        <p:nvSpPr>
+          <p:cNvPr id="2" name="Nadpis 1"/>
+          <p:cNvSpPr>
+            <a:spLocks noGrp="1"/>
+          </p:cNvSpPr>
+          <p:nvPr>
+            <p:ph type="ctrTitle"/>
+          </p:nvPr>
+        </p:nvSpPr>
+        <p:spPr/>
+        <p:txBody>
+          <a:bodyPr/>
+          <a:lstStyle/>
+          <a:p>
+            <a:r>
+              <a:rPr lang="cs-CZ" dirty="0" smtClean="0"/>
+              <a:t>Online </a:t>
+            </a:r>
+            <a:r>
+              <a:rPr lang="cs-CZ" dirty="0" err="1" smtClean="0"/>
+              <a:t>mockupy</a:t>
+            </a:r>
+            <a:endParaRPr lang="cs-CZ" dirty="0"/>
+          </a:p>
+        </p:txBody>
+      </p:sp>
+      <p:sp>
+        <p:nvSpPr>
+          <p:cNvPr id="3" name="Podnadpis 2"/>
+          <p:cNvSpPr>
+            <a:spLocks noGrp="1"/>
+          </p:cNvSpPr>
+          <p:nvPr>
+            <p:ph type="subTitle" idx="1"/>
+          </p:nvPr>
+        </p:nvSpPr>
+        <p:spPr>
+          <a:xfrm>
+            <a:off x="395536" y="3886200"/>
+            <a:ext cx="8352928" cy="1752600"/>
+          </a:xfrm>
+        </p:spPr>
+        <p:txBody>
+          <a:bodyPr/>
+          <a:lstStyle/>
+          <a:p>
+            <a:r>
+              <a:rPr lang="cs-CZ" dirty="0" smtClean="0">
+                <a:hlinkClick r:id="rId3"/>
+              </a:rPr>
+              <a:t>http://myretail.avantcore.cz:14500/myRetail/</a:t>
+            </a:r>
+            <a:endParaRPr lang="cs-CZ" dirty="0" smtClean="0"/>
+          </a:p>
+          <a:p>
+            <a:r>
+              <a:rPr lang="cs-CZ" dirty="0" smtClean="0"/>
+              <a:t>(</a:t>
+            </a:r>
+            <a:r>
+              <a:rPr lang="cs-CZ" dirty="0" smtClean="0">
+                <a:hlinkClick r:id="rId4"/>
+              </a:rPr>
+              <a:t>http://goo.gl/</a:t>
+            </a:r>
+            <a:r>
+              <a:rPr lang="cs-CZ" dirty="0" err="1" smtClean="0">
+                <a:hlinkClick r:id="rId4"/>
+              </a:rPr>
+              <a:t>OdFLi</a:t>
+            </a:r>
+            <a:r>
+              <a:rPr lang="cs-CZ" dirty="0" smtClean="0"/>
+              <a:t>)</a:t>
+            </a:r>
+            <a:endParaRPr lang="cs-CZ" dirty="0"/>
+          </a:p>
+        </p:txBody>
+      </p:sp>
+    </p:spTree>
+    <p:extLst>
+      <p:ext uri="{BB962C8B-B14F-4D97-AF65-F5344CB8AC3E}">
+        <p14:creationId xmlns:p14="http://schemas.microsoft.com/office/powerpoint/2010/main" val="2432751778"/>
+      </p:ext>
+    </p:extLst>
+  </p:cSld>
+  <p:clrMapOvr>
+    <a:masterClrMapping/>
+  </p:clrMapOvr>
+  <mc:AlternateContent xmlns:mc="http://schemas.openxmlformats.org/markup-compatibility/2006">
+    <mc:Choice xmlns:p14="http://schemas.microsoft.com/office/powerpoint/2010/main" Requires="p14">
+      <p:transition>
+        <p14:prism/>
+      </p:transition>
+    </mc:Choice>
+    <mc:Fallback>
+      <p:transition>
+        <p:fade/>
+      </p:transition>
+    </mc:Fallback>
+  </mc:AlternateContent>
+  <p:timing>
+    <p:tnLst>
+      <p:par>
+        <p:cTn id="1" dur="indefinite" restart="never" nodeType="tmRoot"/>
+      </p:par>
+    </p:tnLst>
+  </p:timing>
+</p:sld>
+</file>
+
+<file path=ppt/slides/slide22.xml><?xml version="1.0" encoding="utf-8"?>
+<p:sld xmlns:a="http://schemas.openxmlformats.org/drawingml/2006/main" xmlns:r="http://schemas.openxmlformats.org/officeDocument/2006/relationships" xmlns:p="http://schemas.openxmlformats.org/presentationml/2006/main">
+  <p:cSld>
+    <p:bg>
+      <p:bgPr>
+        <a:blipFill dpi="0" rotWithShape="1">
+          <a:blip r:embed="rId2">
+            <a:lum/>
+          </a:blip>
+          <a:srcRect/>
+          <a:stretch>
+            <a:fillRect/>
+          </a:stretch>
+        </a:blipFill>
+        <a:effectLst/>
+      </p:bgPr>
+    </p:bg>
+    <p:spTree>
+      <p:nvGrpSpPr>
+        <p:cNvPr id="1" name=""/>
+        <p:cNvGrpSpPr/>
+        <p:nvPr/>
+      </p:nvGrpSpPr>
+      <p:grpSpPr>
+        <a:xfrm>
+          <a:off x="0" y="0"/>
+          <a:ext cx="0" cy="0"/>
+          <a:chOff x="0" y="0"/>
+          <a:chExt cx="0" cy="0"/>
+        </a:xfrm>
+      </p:grpSpPr>
+      <p:sp>
+        <p:nvSpPr>
+          <p:cNvPr id="2" name="Nadpis 1"/>
+          <p:cNvSpPr>
+            <a:spLocks noGrp="1"/>
+          </p:cNvSpPr>
+          <p:nvPr>
+            <p:ph type="ctrTitle"/>
+          </p:nvPr>
+        </p:nvSpPr>
+        <p:spPr/>
+        <p:txBody>
+          <a:bodyPr/>
+          <a:lstStyle/>
+          <a:p>
+            <a:r>
+              <a:rPr lang="cs-CZ" dirty="0" smtClean="0"/>
+              <a:t>Online DEMO</a:t>
+            </a:r>
+            <a:endParaRPr lang="cs-CZ" dirty="0"/>
+          </a:p>
+        </p:txBody>
+      </p:sp>
+      <p:sp>
+        <p:nvSpPr>
+          <p:cNvPr id="3" name="Podnadpis 2"/>
+          <p:cNvSpPr>
+            <a:spLocks noGrp="1"/>
+          </p:cNvSpPr>
+          <p:nvPr>
+            <p:ph type="subTitle" idx="1"/>
+          </p:nvPr>
+        </p:nvSpPr>
+        <p:spPr>
+          <a:xfrm>
+            <a:off x="395536" y="3886200"/>
+            <a:ext cx="8352928" cy="1752600"/>
+          </a:xfrm>
+        </p:spPr>
+        <p:txBody>
+          <a:bodyPr/>
+          <a:lstStyle/>
+          <a:p>
+            <a:r>
+              <a:rPr lang="cs-CZ" dirty="0" smtClean="0">
+                <a:hlinkClick r:id="rId3"/>
+              </a:rPr>
+              <a:t>http://myretail.avantcore.cz:14500/</a:t>
+            </a:r>
+            <a:endParaRPr lang="cs-CZ" dirty="0" smtClean="0"/>
+          </a:p>
+          <a:p>
+            <a:r>
+              <a:rPr lang="cs-CZ" dirty="0" smtClean="0"/>
+              <a:t>(</a:t>
+            </a:r>
+            <a:r>
+              <a:rPr lang="cs-CZ" dirty="0" smtClean="0">
+                <a:hlinkClick r:id="rId4"/>
+              </a:rPr>
+              <a:t>http://goo.gl/</a:t>
+            </a:r>
+            <a:r>
+              <a:rPr lang="cs-CZ" dirty="0" err="1" smtClean="0">
+                <a:hlinkClick r:id="rId4"/>
+              </a:rPr>
+              <a:t>PypOH</a:t>
+            </a:r>
+            <a:r>
+              <a:rPr lang="cs-CZ" dirty="0" smtClean="0"/>
+              <a:t>)</a:t>
+            </a:r>
+            <a:endParaRPr lang="cs-CZ" dirty="0"/>
+          </a:p>
+        </p:txBody>
+      </p:sp>
+    </p:spTree>
+    <p:extLst>
+      <p:ext uri="{BB962C8B-B14F-4D97-AF65-F5344CB8AC3E}">
+        <p14:creationId xmlns:p14="http://schemas.microsoft.com/office/powerpoint/2010/main" val="1705473471"/>
+      </p:ext>
+    </p:extLst>
+  </p:cSld>
+  <p:clrMapOvr>
+    <a:masterClrMapping/>
+  </p:clrMapOvr>
+  <mc:AlternateContent xmlns:mc="http://schemas.openxmlformats.org/markup-compatibility/2006">
+    <mc:Choice xmlns:p14="http://schemas.microsoft.com/office/powerpoint/2010/main" Requires="p14">
+      <p:transition>
+        <p14:prism/>
+      </p:transition>
+    </mc:Choice>
+    <mc:Fallback>
+      <p:transition>
+        <p:fade/>
+      </p:transition>
+    </mc:Fallback>
+  </mc:AlternateContent>
+  <p:timing>
+    <p:tnLst>
+      <p:par>
+        <p:cTn id="1" dur="indefinite" restart="never" nodeType="tmRoot"/>
+      </p:par>
+    </p:tnLst>
+  </p:timing>
+</p:sld>
+</file>
+
+<file path=ppt/slides/slide23.xml><?xml version="1.0" encoding="utf-8"?>
+<p:sld xmlns:a="http://schemas.openxmlformats.org/drawingml/2006/main" xmlns:r="http://schemas.openxmlformats.org/officeDocument/2006/relationships" xmlns:p="http://schemas.openxmlformats.org/presentationml/2006/main">
+  <p:cSld>
+    <p:bg>
+      <p:bgPr>
+        <a:blipFill dpi="0" rotWithShape="1">
+          <a:blip r:embed="rId2">
+            <a:lum/>
+          </a:blip>
+          <a:srcRect/>
+          <a:stretch>
+            <a:fillRect/>
+          </a:stretch>
+        </a:blipFill>
+        <a:effectLst/>
+      </p:bgPr>
+    </p:bg>
+    <p:spTree>
+      <p:nvGrpSpPr>
+        <p:cNvPr id="1" name=""/>
+        <p:cNvGrpSpPr/>
+        <p:nvPr/>
+      </p:nvGrpSpPr>
+      <p:grpSpPr>
+        <a:xfrm>
+          <a:off x="0" y="0"/>
+          <a:ext cx="0" cy="0"/>
+          <a:chOff x="0" y="0"/>
+          <a:chExt cx="0" cy="0"/>
+        </a:xfrm>
+      </p:grpSpPr>
+      <p:sp>
+        <p:nvSpPr>
+          <p:cNvPr id="2" name="Nadpis 1"/>
+          <p:cNvSpPr>
+            <a:spLocks noGrp="1"/>
+          </p:cNvSpPr>
+          <p:nvPr>
+            <p:ph type="ctrTitle"/>
+          </p:nvPr>
+        </p:nvSpPr>
+        <p:spPr/>
+        <p:txBody>
+          <a:bodyPr/>
+          <a:lstStyle/>
+          <a:p>
+            <a:r>
+              <a:rPr lang="cs-CZ" dirty="0" smtClean="0"/>
+              <a:t>Kompetenční centrum IBM</a:t>
+            </a:r>
+            <a:endParaRPr lang="cs-CZ" dirty="0"/>
+          </a:p>
+        </p:txBody>
+      </p:sp>
+      <p:sp>
+        <p:nvSpPr>
+          <p:cNvPr id="3" name="Podnadpis 2"/>
+          <p:cNvSpPr>
+            <a:spLocks noGrp="1"/>
+          </p:cNvSpPr>
+          <p:nvPr>
+            <p:ph type="subTitle" idx="1"/>
+          </p:nvPr>
+        </p:nvSpPr>
+        <p:spPr>
+          <a:xfrm>
+            <a:off x="395536" y="3886200"/>
+            <a:ext cx="8352928" cy="1752600"/>
+          </a:xfrm>
+        </p:spPr>
+        <p:txBody>
+          <a:bodyPr/>
+          <a:lstStyle/>
+          <a:p>
+            <a:pPr algn="l"/>
+            <a:r>
+              <a:rPr lang="cs-CZ" b="1" dirty="0" smtClean="0"/>
+              <a:t>KIT </a:t>
+            </a:r>
+            <a:r>
+              <a:rPr lang="cs-CZ" dirty="0" smtClean="0"/>
+              <a:t>- Katedra informačních technologií VŠE</a:t>
+            </a:r>
+          </a:p>
+          <a:p>
+            <a:pPr algn="l"/>
+            <a:r>
+              <a:rPr lang="cs-CZ" b="1" dirty="0" smtClean="0"/>
+              <a:t>MKTI </a:t>
+            </a:r>
+            <a:r>
+              <a:rPr lang="cs-CZ" dirty="0" smtClean="0"/>
+              <a:t>- Marketingový institut</a:t>
+            </a:r>
+          </a:p>
+          <a:p>
+            <a:pPr algn="l"/>
+            <a:r>
+              <a:rPr lang="cs-CZ" b="1" dirty="0" smtClean="0"/>
+              <a:t>GML</a:t>
+            </a:r>
+            <a:r>
+              <a:rPr lang="cs-CZ" dirty="0" smtClean="0"/>
+              <a:t> - Grafická a multimediální laboratoř</a:t>
+            </a:r>
+            <a:endParaRPr lang="cs-CZ" dirty="0"/>
+          </a:p>
+        </p:txBody>
+      </p:sp>
+    </p:spTree>
+    <p:extLst>
+      <p:ext uri="{BB962C8B-B14F-4D97-AF65-F5344CB8AC3E}">
+        <p14:creationId xmlns:p14="http://schemas.microsoft.com/office/powerpoint/2010/main" val="2932235165"/>
+      </p:ext>
+    </p:extLst>
+  </p:cSld>
+  <p:clrMapOvr>
+    <a:masterClrMapping/>
+  </p:clrMapOvr>
+  <mc:AlternateContent xmlns:mc="http://schemas.openxmlformats.org/markup-compatibility/2006">
+    <mc:Choice xmlns:p14="http://schemas.microsoft.com/office/powerpoint/2010/main" Requires="p14">
+      <p:transition>
+        <p14:prism/>
+      </p:transition>
+    </mc:Choice>
+    <mc:Fallback>
+      <p:transition>
+        <p:fade/>
+      </p:transition>
+    </mc:Fallback>
+  </mc:AlternateContent>
+  <p:timing>
+    <p:tnLst>
+      <p:par>
+        <p:cTn id="1" dur="indefinite" restart="never" nodeType="tmRoot"/>
+      </p:par>
+    </p:tnLst>
+  </p:timing>
+</p:sld>
+</file>
+
+<file path=ppt/slides/slide3.xml><?xml version="1.0" encoding="utf-8"?>
+<p:sld xmlns:a="http://schemas.openxmlformats.org/drawingml/2006/main" xmlns:r="http://schemas.openxmlformats.org/officeDocument/2006/relationships" xmlns:p="http://schemas.openxmlformats.org/presentationml/2006/main">
+  <p:cSld>
+    <p:spTree>
+      <p:nvGrpSpPr>
+        <p:cNvPr id="1" name=""/>
+        <p:cNvGrpSpPr/>
+        <p:nvPr/>
+      </p:nvGrpSpPr>
+      <p:grpSpPr>
+        <a:xfrm>
+          <a:off x="0" y="0"/>
+          <a:ext cx="0" cy="0"/>
+          <a:chOff x="0" y="0"/>
+          <a:chExt cx="0" cy="0"/>
+        </a:xfrm>
+      </p:grpSpPr>
+      <p:pic>
+        <p:nvPicPr>
+          <p:cNvPr id="1026" name="Picture 2"/>
+          <p:cNvPicPr>
+            <a:picLocks noChangeAspect="1" noChangeArrowheads="1"/>
+          </p:cNvPicPr>
+          <p:nvPr/>
+        </p:nvPicPr>
+        <p:blipFill>
+          <a:blip r:embed="rId2">
+            <a:extLst>
+              <a:ext uri="{28A0092B-C50C-407E-A947-70E740481C1C}">
+                <a14:useLocalDpi xmlns:a14="http://schemas.microsoft.com/office/drawing/2010/main" val="0"/>
+              </a:ext>
+            </a:extLst>
+          </a:blip>
+          <a:stretch>
+            <a:fillRect/>
+          </a:stretch>
+        </p:blipFill>
+        <p:spPr bwMode="auto">
+          <a:xfrm>
+            <a:off x="0" y="-10953"/>
+            <a:ext cx="3795174" cy="6868953"/>
+          </a:xfrm>
+          <a:prstGeom prst="rect">
+            <a:avLst/>
+          </a:prstGeom>
+          <a:noFill/>
+          <a:extLst>
+            <a:ext uri="{909E8E84-426E-40DD-AFC4-6F175D3DCCD1}">
+              <a14:hiddenFill xmlns:a14="http://schemas.microsoft.com/office/drawing/2010/main">
+                <a:solidFill>
+                  <a:srgbClr val="FFFFFF"/>
+                </a:solidFill>
+              </a14:hiddenFill>
+            </a:ext>
+          </a:extLst>
+        </p:spPr>
+      </p:pic>
+      <p:sp>
+        <p:nvSpPr>
+          <p:cNvPr id="2" name="Nadpis 1"/>
+          <p:cNvSpPr>
+            <a:spLocks noGrp="1"/>
+          </p:cNvSpPr>
+          <p:nvPr>
+            <p:ph type="title"/>
+          </p:nvPr>
+        </p:nvSpPr>
+        <p:spPr>
+          <a:xfrm>
+            <a:off x="4211960" y="274638"/>
+            <a:ext cx="4474839" cy="1143000"/>
+          </a:xfrm>
+        </p:spPr>
+        <p:txBody>
+          <a:bodyPr/>
+          <a:lstStyle/>
+          <a:p>
+            <a:pPr algn="r"/>
+            <a:r>
+              <a:rPr lang="cs-CZ" dirty="0" smtClean="0"/>
+              <a:t>Domácí obrazovka</a:t>
+            </a:r>
+            <a:endParaRPr lang="cs-CZ" dirty="0"/>
+          </a:p>
+        </p:txBody>
+      </p:sp>
+      <p:sp>
+        <p:nvSpPr>
+          <p:cNvPr id="3" name="Zástupný symbol pro obsah 2"/>
+          <p:cNvSpPr>
+            <a:spLocks noGrp="1"/>
+          </p:cNvSpPr>
+          <p:nvPr>
+            <p:ph idx="1"/>
+          </p:nvPr>
+        </p:nvSpPr>
+        <p:spPr>
+          <a:xfrm>
+            <a:off x="4067944" y="1600200"/>
+            <a:ext cx="4618856" cy="4525963"/>
+          </a:xfrm>
+        </p:spPr>
+        <p:txBody>
+          <a:bodyPr>
+            <a:normAutofit/>
+          </a:bodyPr>
+          <a:lstStyle/>
+          <a:p>
+            <a:r>
+              <a:rPr lang="cs-CZ" dirty="0" smtClean="0"/>
+              <a:t>Základní menu</a:t>
+            </a:r>
+          </a:p>
+          <a:p>
+            <a:endParaRPr lang="cs-CZ" dirty="0" smtClean="0"/>
+          </a:p>
+          <a:p>
+            <a:r>
+              <a:rPr lang="cs-CZ" dirty="0" smtClean="0"/>
+              <a:t>Přehledně počet nabídek</a:t>
+            </a:r>
+          </a:p>
+          <a:p>
+            <a:r>
+              <a:rPr lang="cs-CZ" dirty="0" smtClean="0"/>
+              <a:t>QR kód pro identifikace na pokladně</a:t>
+            </a:r>
+          </a:p>
+          <a:p>
+            <a:r>
+              <a:rPr lang="cs-CZ" dirty="0" smtClean="0"/>
+              <a:t>Věrnostní body</a:t>
+            </a:r>
+          </a:p>
+          <a:p>
+            <a:r>
+              <a:rPr lang="cs-CZ" dirty="0" smtClean="0"/>
+              <a:t>Věrnostní status</a:t>
+            </a:r>
+          </a:p>
+        </p:txBody>
+      </p:sp>
+    </p:spTree>
+    <p:extLst>
+      <p:ext uri="{BB962C8B-B14F-4D97-AF65-F5344CB8AC3E}">
+        <p14:creationId xmlns:p14="http://schemas.microsoft.com/office/powerpoint/2010/main" val="2180295703"/>
+      </p:ext>
+    </p:extLst>
+  </p:cSld>
+  <p:clrMapOvr>
+    <a:masterClrMapping/>
+  </p:clrMapOvr>
+  <mc:AlternateContent xmlns:mc="http://schemas.openxmlformats.org/markup-compatibility/2006">
+    <mc:Choice xmlns:p14="http://schemas.microsoft.com/office/powerpoint/2010/main" Requires="p14">
+      <p:transition>
+        <p14:prism/>
+      </p:transition>
+    </mc:Choice>
+    <mc:Fallback>
+      <p:transition>
+        <p:fade/>
+      </p:transition>
+    </mc:Fallback>
+  </mc:AlternateContent>
+  <p:timing>
+    <p:tnLst>
+      <p:par>
+        <p:cTn id="1" dur="indefinite" restart="never" nodeType="tmRoot"/>
+      </p:par>
+    </p:tnLst>
+  </p:timing>
+</p:sld>
+</file>
+
+<file path=ppt/slides/slide4.xml><?xml version="1.0" encoding="utf-8"?>
+<p:sld xmlns:a="http://schemas.openxmlformats.org/drawingml/2006/main" xmlns:r="http://schemas.openxmlformats.org/officeDocument/2006/relationships" xmlns:p="http://schemas.openxmlformats.org/presentationml/2006/main">
+  <p:cSld>
+    <p:spTree>
+      <p:nvGrpSpPr>
+        <p:cNvPr id="1" name=""/>
+        <p:cNvGrpSpPr/>
+        <p:nvPr/>
+      </p:nvGrpSpPr>
+      <p:grpSpPr>
+        <a:xfrm>
+          <a:off x="0" y="0"/>
+          <a:ext cx="0" cy="0"/>
+          <a:chOff x="0" y="0"/>
+          <a:chExt cx="0" cy="0"/>
+        </a:xfrm>
+      </p:grpSpPr>
+      <p:pic>
+        <p:nvPicPr>
+          <p:cNvPr id="1026" name="Picture 2"/>
+          <p:cNvPicPr>
+            <a:picLocks noChangeAspect="1" noChangeArrowheads="1"/>
+          </p:cNvPicPr>
+          <p:nvPr/>
+        </p:nvPicPr>
+        <p:blipFill>
+          <a:blip r:embed="rId2">
+            <a:extLst>
+              <a:ext uri="{28A0092B-C50C-407E-A947-70E740481C1C}">
+                <a14:useLocalDpi xmlns:a14="http://schemas.microsoft.com/office/drawing/2010/main" val="0"/>
+              </a:ext>
+            </a:extLst>
+          </a:blip>
+          <a:stretch>
+            <a:fillRect/>
+          </a:stretch>
+        </p:blipFill>
+        <p:spPr bwMode="auto">
+          <a:xfrm>
+            <a:off x="0" y="-10953"/>
+            <a:ext cx="3795174" cy="6868953"/>
+          </a:xfrm>
+          <a:prstGeom prst="rect">
+            <a:avLst/>
+          </a:prstGeom>
+          <a:noFill/>
+          <a:extLst>
+            <a:ext uri="{909E8E84-426E-40DD-AFC4-6F175D3DCCD1}">
+              <a14:hiddenFill xmlns:a14="http://schemas.microsoft.com/office/drawing/2010/main">
+                <a:solidFill>
+                  <a:srgbClr val="FFFFFF"/>
+                </a:solidFill>
+              </a14:hiddenFill>
+            </a:ext>
+          </a:extLst>
+        </p:spPr>
+      </p:pic>
+      <p:sp>
+        <p:nvSpPr>
+          <p:cNvPr id="2" name="Nadpis 1"/>
+          <p:cNvSpPr>
+            <a:spLocks noGrp="1"/>
+          </p:cNvSpPr>
+          <p:nvPr>
+            <p:ph type="title"/>
+          </p:nvPr>
+        </p:nvSpPr>
+        <p:spPr>
+          <a:xfrm>
+            <a:off x="4211960" y="274638"/>
+            <a:ext cx="4474839" cy="1143000"/>
+          </a:xfrm>
+        </p:spPr>
+        <p:txBody>
+          <a:bodyPr/>
+          <a:lstStyle/>
+          <a:p>
+            <a:pPr algn="r"/>
+            <a:r>
+              <a:rPr lang="cs-CZ" dirty="0" smtClean="0"/>
+              <a:t>Výběr účtu</a:t>
+            </a:r>
+            <a:endParaRPr lang="cs-CZ" dirty="0"/>
+          </a:p>
+        </p:txBody>
+      </p:sp>
+      <p:sp>
+        <p:nvSpPr>
+          <p:cNvPr id="3" name="Zástupný symbol pro obsah 2"/>
+          <p:cNvSpPr>
+            <a:spLocks noGrp="1"/>
+          </p:cNvSpPr>
+          <p:nvPr>
+            <p:ph idx="1"/>
+          </p:nvPr>
+        </p:nvSpPr>
+        <p:spPr>
+          <a:xfrm>
+            <a:off x="4067944" y="1600200"/>
+            <a:ext cx="4618856" cy="4525963"/>
+          </a:xfrm>
+        </p:spPr>
+        <p:txBody>
+          <a:bodyPr>
+            <a:normAutofit/>
+          </a:bodyPr>
+          <a:lstStyle/>
+          <a:p>
+            <a:r>
+              <a:rPr lang="cs-CZ" dirty="0" smtClean="0"/>
+              <a:t>Výběr různých účtů uživatele (skupiny)</a:t>
+            </a:r>
+          </a:p>
+          <a:p>
+            <a:r>
+              <a:rPr lang="cs-CZ" dirty="0" smtClean="0"/>
+              <a:t>Různé typy identifikace</a:t>
+            </a:r>
+          </a:p>
+          <a:p>
+            <a:pPr lvl="1"/>
+            <a:r>
+              <a:rPr lang="cs-CZ" dirty="0" smtClean="0"/>
+              <a:t>QR kód</a:t>
+            </a:r>
+          </a:p>
+          <a:p>
+            <a:pPr lvl="1"/>
+            <a:r>
+              <a:rPr lang="cs-CZ" dirty="0" smtClean="0"/>
+              <a:t>Čárový kód</a:t>
+            </a:r>
+          </a:p>
+          <a:p>
+            <a:pPr lvl="1"/>
+            <a:r>
+              <a:rPr lang="cs-CZ" dirty="0" smtClean="0"/>
+              <a:t>NFC</a:t>
+            </a:r>
+          </a:p>
+          <a:p>
+            <a:pPr lvl="1"/>
+            <a:r>
+              <a:rPr lang="cs-CZ" dirty="0"/>
+              <a:t>a</a:t>
+            </a:r>
+            <a:r>
+              <a:rPr lang="cs-CZ" dirty="0" smtClean="0"/>
+              <a:t> další…</a:t>
+            </a:r>
+          </a:p>
+        </p:txBody>
+      </p:sp>
+    </p:spTree>
+    <p:extLst>
+      <p:ext uri="{BB962C8B-B14F-4D97-AF65-F5344CB8AC3E}">
+        <p14:creationId xmlns:p14="http://schemas.microsoft.com/office/powerpoint/2010/main" val="975289128"/>
+      </p:ext>
+    </p:extLst>
+  </p:cSld>
+  <p:clrMapOvr>
+    <a:masterClrMapping/>
+  </p:clrMapOvr>
+  <mc:AlternateContent xmlns:mc="http://schemas.openxmlformats.org/markup-compatibility/2006">
+    <mc:Choice xmlns:p14="http://schemas.microsoft.com/office/powerpoint/2010/main" Requires="p14">
+      <p:transition>
+        <p14:prism/>
+      </p:transition>
+    </mc:Choice>
+    <mc:Fallback>
+      <p:transition>
+        <p:fade/>
+      </p:transition>
+    </mc:Fallback>
+  </mc:AlternateContent>
+  <p:timing>
+    <p:tnLst>
+      <p:par>
+        <p:cTn id="1" dur="indefinite" restart="never" nodeType="tmRoot"/>
+      </p:par>
+    </p:tnLst>
+  </p:timing>
+</p:sld>
+</file>
+
+<file path=ppt/slides/slide5.xml><?xml version="1.0" encoding="utf-8"?>
+<p:sld xmlns:a="http://schemas.openxmlformats.org/drawingml/2006/main" xmlns:r="http://schemas.openxmlformats.org/officeDocument/2006/relationships" xmlns:p="http://schemas.openxmlformats.org/presentationml/2006/main">
+  <p:cSld>
+    <p:spTree>
+      <p:nvGrpSpPr>
+        <p:cNvPr id="1" name=""/>
+        <p:cNvGrpSpPr/>
+        <p:nvPr/>
+      </p:nvGrpSpPr>
+      <p:grpSpPr>
+        <a:xfrm>
+          <a:off x="0" y="0"/>
+          <a:ext cx="0" cy="0"/>
+          <a:chOff x="0" y="0"/>
+          <a:chExt cx="0" cy="0"/>
+        </a:xfrm>
+      </p:grpSpPr>
+      <p:pic>
+        <p:nvPicPr>
+          <p:cNvPr id="1026" name="Picture 2"/>
+          <p:cNvPicPr>
+            <a:picLocks noChangeAspect="1" noChangeArrowheads="1"/>
+          </p:cNvPicPr>
+          <p:nvPr/>
+        </p:nvPicPr>
+        <p:blipFill>
+          <a:blip r:embed="rId2">
+            <a:extLst>
+              <a:ext uri="{28A0092B-C50C-407E-A947-70E740481C1C}">
+                <a14:useLocalDpi xmlns:a14="http://schemas.microsoft.com/office/drawing/2010/main" val="0"/>
+              </a:ext>
+            </a:extLst>
+          </a:blip>
+          <a:stretch>
+            <a:fillRect/>
+          </a:stretch>
+        </p:blipFill>
+        <p:spPr bwMode="auto">
+          <a:xfrm>
+            <a:off x="0" y="-10953"/>
+            <a:ext cx="3795174" cy="6868953"/>
+          </a:xfrm>
+          <a:prstGeom prst="rect">
+            <a:avLst/>
+          </a:prstGeom>
+          <a:noFill/>
+          <a:extLst>
+            <a:ext uri="{909E8E84-426E-40DD-AFC4-6F175D3DCCD1}">
+              <a14:hiddenFill xmlns:a14="http://schemas.microsoft.com/office/drawing/2010/main">
+                <a:solidFill>
+                  <a:srgbClr val="FFFFFF"/>
+                </a:solidFill>
+              </a14:hiddenFill>
+            </a:ext>
+          </a:extLst>
+        </p:spPr>
+      </p:pic>
+      <p:sp>
+        <p:nvSpPr>
+          <p:cNvPr id="2" name="Nadpis 1"/>
+          <p:cNvSpPr>
+            <a:spLocks noGrp="1"/>
+          </p:cNvSpPr>
+          <p:nvPr>
+            <p:ph type="title"/>
+          </p:nvPr>
+        </p:nvSpPr>
+        <p:spPr>
+          <a:xfrm>
+            <a:off x="4211960" y="274638"/>
+            <a:ext cx="4474839" cy="1143000"/>
+          </a:xfrm>
+        </p:spPr>
+        <p:txBody>
+          <a:bodyPr/>
+          <a:lstStyle/>
+          <a:p>
+            <a:pPr algn="r"/>
+            <a:r>
+              <a:rPr lang="cs-CZ" dirty="0" smtClean="0"/>
+              <a:t>Nabídky</a:t>
+            </a:r>
+            <a:endParaRPr lang="cs-CZ" dirty="0"/>
+          </a:p>
+        </p:txBody>
+      </p:sp>
+      <p:sp>
+        <p:nvSpPr>
+          <p:cNvPr id="3" name="Zástupný symbol pro obsah 2"/>
+          <p:cNvSpPr>
+            <a:spLocks noGrp="1"/>
+          </p:cNvSpPr>
+          <p:nvPr>
+            <p:ph idx="1"/>
+          </p:nvPr>
+        </p:nvSpPr>
+        <p:spPr>
+          <a:xfrm>
+            <a:off x="4067944" y="1600200"/>
+            <a:ext cx="4618856" cy="4525963"/>
+          </a:xfrm>
+        </p:spPr>
+        <p:txBody>
+          <a:bodyPr>
+            <a:normAutofit/>
+          </a:bodyPr>
+          <a:lstStyle/>
+          <a:p>
+            <a:r>
+              <a:rPr lang="cs-CZ" dirty="0" smtClean="0"/>
+              <a:t>Nové nabídky</a:t>
+            </a:r>
+          </a:p>
+          <a:p>
+            <a:r>
+              <a:rPr lang="cs-CZ" dirty="0" smtClean="0"/>
+              <a:t>Individuální</a:t>
+            </a:r>
+          </a:p>
+          <a:p>
+            <a:r>
+              <a:rPr lang="cs-CZ" dirty="0" smtClean="0"/>
+              <a:t>Plošné (letákové)</a:t>
+            </a:r>
+          </a:p>
+          <a:p>
+            <a:r>
+              <a:rPr lang="cs-CZ" dirty="0" smtClean="0"/>
+              <a:t>Pro zákaznický segment</a:t>
+            </a:r>
+          </a:p>
+          <a:p>
+            <a:pPr lvl="1"/>
+            <a:r>
+              <a:rPr lang="cs-CZ" dirty="0"/>
+              <a:t>č</a:t>
+            </a:r>
+            <a:r>
+              <a:rPr lang="cs-CZ" dirty="0" smtClean="0"/>
+              <a:t>i uživatelskou skupinu</a:t>
+            </a:r>
+          </a:p>
+          <a:p>
+            <a:r>
+              <a:rPr lang="cs-CZ" dirty="0" smtClean="0"/>
+              <a:t>Soc. informace</a:t>
+            </a:r>
+          </a:p>
+          <a:p>
+            <a:pPr lvl="1"/>
+            <a:r>
+              <a:rPr lang="cs-CZ" dirty="0" smtClean="0"/>
+              <a:t>Hodnocení</a:t>
+            </a:r>
+          </a:p>
+          <a:p>
+            <a:pPr lvl="1"/>
+            <a:r>
+              <a:rPr lang="cs-CZ" dirty="0" smtClean="0"/>
+              <a:t>Počet nákupů</a:t>
+            </a:r>
+          </a:p>
+        </p:txBody>
+      </p:sp>
+    </p:spTree>
+    <p:extLst>
+      <p:ext uri="{BB962C8B-B14F-4D97-AF65-F5344CB8AC3E}">
+        <p14:creationId xmlns:p14="http://schemas.microsoft.com/office/powerpoint/2010/main" val="1703552029"/>
+      </p:ext>
+    </p:extLst>
+  </p:cSld>
+  <p:clrMapOvr>
+    <a:masterClrMapping/>
+  </p:clrMapOvr>
+  <mc:AlternateContent xmlns:mc="http://schemas.openxmlformats.org/markup-compatibility/2006">
+    <mc:Choice xmlns:p14="http://schemas.microsoft.com/office/powerpoint/2010/main" Requires="p14">
+      <p:transition>
+        <p14:prism/>
+      </p:transition>
+    </mc:Choice>
+    <mc:Fallback>
+      <p:transition>
+        <p:fade/>
+      </p:transition>
+    </mc:Fallback>
+  </mc:AlternateContent>
+  <p:timing>
+    <p:tnLst>
+      <p:par>
+        <p:cTn id="1" dur="indefinite" restart="never" nodeType="tmRoot"/>
+      </p:par>
+    </p:tnLst>
+  </p:timing>
+</p:sld>
+</file>
+
+<file path=ppt/slides/slide6.xml><?xml version="1.0" encoding="utf-8"?>
+<p:sld xmlns:a="http://schemas.openxmlformats.org/drawingml/2006/main" xmlns:r="http://schemas.openxmlformats.org/officeDocument/2006/relationships" xmlns:p="http://schemas.openxmlformats.org/presentationml/2006/main">
+  <p:cSld>
+    <p:spTree>
+      <p:nvGrpSpPr>
+        <p:cNvPr id="1" name=""/>
+        <p:cNvGrpSpPr/>
+        <p:nvPr/>
+      </p:nvGrpSpPr>
+      <p:grpSpPr>
+        <a:xfrm>
+          <a:off x="0" y="0"/>
+          <a:ext cx="0" cy="0"/>
+          <a:chOff x="0" y="0"/>
+          <a:chExt cx="0" cy="0"/>
+        </a:xfrm>
+      </p:grpSpPr>
+      <p:pic>
+        <p:nvPicPr>
+          <p:cNvPr id="1026" name="Picture 2"/>
+          <p:cNvPicPr>
+            <a:picLocks noChangeAspect="1" noChangeArrowheads="1"/>
+          </p:cNvPicPr>
+          <p:nvPr/>
+        </p:nvPicPr>
+        <p:blipFill>
+          <a:blip r:embed="rId2">
+            <a:extLst>
+              <a:ext uri="{28A0092B-C50C-407E-A947-70E740481C1C}">
+                <a14:useLocalDpi xmlns:a14="http://schemas.microsoft.com/office/drawing/2010/main" val="0"/>
+              </a:ext>
+            </a:extLst>
+          </a:blip>
+          <a:stretch>
+            <a:fillRect/>
+          </a:stretch>
+        </p:blipFill>
+        <p:spPr bwMode="auto">
+          <a:xfrm>
+            <a:off x="0" y="-10953"/>
+            <a:ext cx="3795174" cy="6868953"/>
+          </a:xfrm>
+          <a:prstGeom prst="rect">
+            <a:avLst/>
+          </a:prstGeom>
+          <a:noFill/>
+          <a:extLst>
+            <a:ext uri="{909E8E84-426E-40DD-AFC4-6F175D3DCCD1}">
+              <a14:hiddenFill xmlns:a14="http://schemas.microsoft.com/office/drawing/2010/main">
+                <a:solidFill>
+                  <a:srgbClr val="FFFFFF"/>
+                </a:solidFill>
+              </a14:hiddenFill>
+            </a:ext>
+          </a:extLst>
+        </p:spPr>
+      </p:pic>
+      <p:sp>
+        <p:nvSpPr>
+          <p:cNvPr id="2" name="Nadpis 1"/>
+          <p:cNvSpPr>
+            <a:spLocks noGrp="1"/>
+          </p:cNvSpPr>
+          <p:nvPr>
+            <p:ph type="title"/>
+          </p:nvPr>
+        </p:nvSpPr>
+        <p:spPr>
+          <a:xfrm>
+            <a:off x="4211960" y="274638"/>
+            <a:ext cx="4474839" cy="1143000"/>
+          </a:xfrm>
+        </p:spPr>
+        <p:txBody>
+          <a:bodyPr/>
+          <a:lstStyle/>
+          <a:p>
+            <a:pPr algn="r"/>
+            <a:r>
+              <a:rPr lang="cs-CZ" dirty="0" smtClean="0"/>
+              <a:t>Slevová nabídka</a:t>
+            </a:r>
+            <a:endParaRPr lang="cs-CZ" dirty="0"/>
+          </a:p>
+        </p:txBody>
+      </p:sp>
+      <p:sp>
+        <p:nvSpPr>
+          <p:cNvPr id="3" name="Zástupný symbol pro obsah 2"/>
+          <p:cNvSpPr>
+            <a:spLocks noGrp="1"/>
+          </p:cNvSpPr>
+          <p:nvPr>
+            <p:ph idx="1"/>
+          </p:nvPr>
+        </p:nvSpPr>
+        <p:spPr>
+          <a:xfrm>
+            <a:off x="4067944" y="1600200"/>
+            <a:ext cx="4618856" cy="4525963"/>
+          </a:xfrm>
+        </p:spPr>
+        <p:txBody>
+          <a:bodyPr>
+            <a:normAutofit/>
+          </a:bodyPr>
+          <a:lstStyle/>
+          <a:p>
+            <a:r>
+              <a:rPr lang="cs-CZ" dirty="0" smtClean="0"/>
+              <a:t>Obrázky produktu</a:t>
+            </a:r>
+          </a:p>
+          <a:p>
+            <a:r>
+              <a:rPr lang="cs-CZ" dirty="0" smtClean="0"/>
+              <a:t>Sociální hodnocení</a:t>
+            </a:r>
+          </a:p>
+          <a:p>
+            <a:r>
+              <a:rPr lang="cs-CZ" dirty="0" smtClean="0"/>
+              <a:t>Popis nabídky</a:t>
+            </a:r>
+          </a:p>
+          <a:p>
+            <a:r>
+              <a:rPr lang="cs-CZ" dirty="0" smtClean="0"/>
+              <a:t>Ceny</a:t>
+            </a:r>
+          </a:p>
+          <a:p>
+            <a:r>
+              <a:rPr lang="cs-CZ" dirty="0" smtClean="0"/>
+              <a:t>% slevy</a:t>
+            </a:r>
+          </a:p>
+          <a:p>
+            <a:r>
+              <a:rPr lang="cs-CZ" dirty="0" smtClean="0"/>
+              <a:t>Platnost</a:t>
+            </a:r>
+          </a:p>
+        </p:txBody>
+      </p:sp>
+    </p:spTree>
+    <p:extLst>
+      <p:ext uri="{BB962C8B-B14F-4D97-AF65-F5344CB8AC3E}">
+        <p14:creationId xmlns:p14="http://schemas.microsoft.com/office/powerpoint/2010/main" val="3037200525"/>
+      </p:ext>
+    </p:extLst>
+  </p:cSld>
+  <p:clrMapOvr>
+    <a:masterClrMapping/>
+  </p:clrMapOvr>
+  <mc:AlternateContent xmlns:mc="http://schemas.openxmlformats.org/markup-compatibility/2006">
+    <mc:Choice xmlns:p14="http://schemas.microsoft.com/office/powerpoint/2010/main" Requires="p14">
+      <p:transition>
+        <p14:prism/>
+      </p:transition>
+    </mc:Choice>
+    <mc:Fallback>
+      <p:transition>
+        <p:fade/>
+      </p:transition>
+    </mc:Fallback>
+  </mc:AlternateContent>
+  <p:timing>
+    <p:tnLst>
+      <p:par>
+        <p:cTn id="1" dur="indefinite" restart="never" nodeType="tmRoot"/>
+      </p:par>
+    </p:tnLst>
+  </p:timing>
+</p:sld>
+</file>
+
+<file path=ppt/slides/slide7.xml><?xml version="1.0" encoding="utf-8"?>
+<p:sld xmlns:a="http://schemas.openxmlformats.org/drawingml/2006/main" xmlns:r="http://schemas.openxmlformats.org/officeDocument/2006/relationships" xmlns:p="http://schemas.openxmlformats.org/presentationml/2006/main">
+  <p:cSld>
+    <p:spTree>
+      <p:nvGrpSpPr>
+        <p:cNvPr id="1" name=""/>
+        <p:cNvGrpSpPr/>
+        <p:nvPr/>
+      </p:nvGrpSpPr>
+      <p:grpSpPr>
+        <a:xfrm>
+          <a:off x="0" y="0"/>
+          <a:ext cx="0" cy="0"/>
+          <a:chOff x="0" y="0"/>
+          <a:chExt cx="0" cy="0"/>
+        </a:xfrm>
+      </p:grpSpPr>
+      <p:pic>
+        <p:nvPicPr>
+          <p:cNvPr id="1026" name="Picture 2"/>
+          <p:cNvPicPr>
+            <a:picLocks noChangeAspect="1" noChangeArrowheads="1"/>
+          </p:cNvPicPr>
+          <p:nvPr/>
+        </p:nvPicPr>
+        <p:blipFill>
+          <a:blip r:embed="rId2">
+            <a:extLst>
+              <a:ext uri="{28A0092B-C50C-407E-A947-70E740481C1C}">
+                <a14:useLocalDpi xmlns:a14="http://schemas.microsoft.com/office/drawing/2010/main" val="0"/>
+              </a:ext>
+            </a:extLst>
+          </a:blip>
+          <a:stretch>
+            <a:fillRect/>
+          </a:stretch>
+        </p:blipFill>
+        <p:spPr bwMode="auto">
+          <a:xfrm>
+            <a:off x="0" y="-10953"/>
+            <a:ext cx="3795174" cy="6868953"/>
+          </a:xfrm>
+          <a:prstGeom prst="rect">
+            <a:avLst/>
+          </a:prstGeom>
+          <a:noFill/>
+          <a:extLst>
+            <a:ext uri="{909E8E84-426E-40DD-AFC4-6F175D3DCCD1}">
+              <a14:hiddenFill xmlns:a14="http://schemas.microsoft.com/office/drawing/2010/main">
+                <a:solidFill>
+                  <a:srgbClr val="FFFFFF"/>
+                </a:solidFill>
+              </a14:hiddenFill>
+            </a:ext>
+          </a:extLst>
+        </p:spPr>
+      </p:pic>
+      <p:sp>
+        <p:nvSpPr>
+          <p:cNvPr id="2" name="Nadpis 1"/>
+          <p:cNvSpPr>
+            <a:spLocks noGrp="1"/>
+          </p:cNvSpPr>
+          <p:nvPr>
+            <p:ph type="title"/>
+          </p:nvPr>
+        </p:nvSpPr>
+        <p:spPr>
+          <a:xfrm>
+            <a:off x="4211960" y="274638"/>
+            <a:ext cx="4474839" cy="1143000"/>
+          </a:xfrm>
+        </p:spPr>
+        <p:txBody>
+          <a:bodyPr/>
+          <a:lstStyle/>
+          <a:p>
+            <a:pPr algn="r"/>
+            <a:r>
+              <a:rPr lang="cs-CZ" dirty="0" smtClean="0"/>
+              <a:t>Upozornění</a:t>
+            </a:r>
+            <a:endParaRPr lang="cs-CZ" dirty="0"/>
+          </a:p>
+        </p:txBody>
+      </p:sp>
+      <p:sp>
+        <p:nvSpPr>
+          <p:cNvPr id="3" name="Zástupný symbol pro obsah 2"/>
+          <p:cNvSpPr>
+            <a:spLocks noGrp="1"/>
+          </p:cNvSpPr>
+          <p:nvPr>
+            <p:ph idx="1"/>
+          </p:nvPr>
+        </p:nvSpPr>
+        <p:spPr>
+          <a:xfrm>
+            <a:off x="4067944" y="1600200"/>
+            <a:ext cx="4618856" cy="4525963"/>
+          </a:xfrm>
+        </p:spPr>
+        <p:txBody>
+          <a:bodyPr>
+            <a:normAutofit/>
+          </a:bodyPr>
+          <a:lstStyle/>
+          <a:p>
+            <a:r>
+              <a:rPr lang="cs-CZ" dirty="0" smtClean="0"/>
+              <a:t>Veškeré změny</a:t>
+            </a:r>
+          </a:p>
+          <a:p>
+            <a:r>
+              <a:rPr lang="cs-CZ" dirty="0" smtClean="0"/>
+              <a:t>Nové nabídky</a:t>
+            </a:r>
+          </a:p>
+          <a:p>
+            <a:r>
+              <a:rPr lang="cs-CZ" dirty="0" smtClean="0"/>
+              <a:t>Získané body</a:t>
+            </a:r>
+          </a:p>
+          <a:p>
+            <a:r>
+              <a:rPr lang="cs-CZ" dirty="0" smtClean="0"/>
+              <a:t>Provedené nákupy</a:t>
+            </a:r>
+          </a:p>
+          <a:p>
+            <a:r>
+              <a:rPr lang="cs-CZ" dirty="0" smtClean="0"/>
+              <a:t>Chyby a varování</a:t>
+            </a:r>
+          </a:p>
+          <a:p>
+            <a:r>
+              <a:rPr lang="cs-CZ" dirty="0" smtClean="0"/>
+              <a:t>Zákaznické sdělení</a:t>
+            </a:r>
+          </a:p>
+          <a:p>
+            <a:r>
+              <a:rPr lang="cs-CZ" dirty="0" smtClean="0"/>
+              <a:t>a další…</a:t>
+            </a:r>
+          </a:p>
+        </p:txBody>
+      </p:sp>
+    </p:spTree>
+    <p:extLst>
+      <p:ext uri="{BB962C8B-B14F-4D97-AF65-F5344CB8AC3E}">
+        <p14:creationId xmlns:p14="http://schemas.microsoft.com/office/powerpoint/2010/main" val="152259602"/>
+      </p:ext>
+    </p:extLst>
+  </p:cSld>
+  <p:clrMapOvr>
+    <a:masterClrMapping/>
+  </p:clrMapOvr>
+  <mc:AlternateContent xmlns:mc="http://schemas.openxmlformats.org/markup-compatibility/2006">
+    <mc:Choice xmlns:p14="http://schemas.microsoft.com/office/powerpoint/2010/main" Requires="p14">
+      <p:transition>
+        <p14:prism/>
+      </p:transition>
+    </mc:Choice>
+    <mc:Fallback>
+      <p:transition>
+        <p:fade/>
+      </p:transition>
+    </mc:Fallback>
+  </mc:AlternateContent>
+  <p:timing>
+    <p:tnLst>
+      <p:par>
+        <p:cTn id="1" dur="indefinite" restart="never" nodeType="tmRoot"/>
+      </p:par>
+    </p:tnLst>
+  </p:timing>
+</p:sld>
+</file>
+
+<file path=ppt/slides/slide8.xml><?xml version="1.0" encoding="utf-8"?>
+<p:sld xmlns:a="http://schemas.openxmlformats.org/drawingml/2006/main" xmlns:r="http://schemas.openxmlformats.org/officeDocument/2006/relationships" xmlns:p="http://schemas.openxmlformats.org/presentationml/2006/main">
+  <p:cSld>
+    <p:spTree>
+      <p:nvGrpSpPr>
+        <p:cNvPr id="1" name=""/>
+        <p:cNvGrpSpPr/>
+        <p:nvPr/>
+      </p:nvGrpSpPr>
+      <p:grpSpPr>
+        <a:xfrm>
+          <a:off x="0" y="0"/>
+          <a:ext cx="0" cy="0"/>
+          <a:chOff x="0" y="0"/>
+          <a:chExt cx="0" cy="0"/>
+        </a:xfrm>
+      </p:grpSpPr>
+      <p:pic>
+        <p:nvPicPr>
+          <p:cNvPr id="1026" name="Picture 2"/>
+          <p:cNvPicPr>
+            <a:picLocks noChangeAspect="1" noChangeArrowheads="1"/>
+          </p:cNvPicPr>
+          <p:nvPr/>
+        </p:nvPicPr>
+        <p:blipFill>
+          <a:blip r:embed="rId2">
+            <a:extLst>
+              <a:ext uri="{28A0092B-C50C-407E-A947-70E740481C1C}">
+                <a14:useLocalDpi xmlns:a14="http://schemas.microsoft.com/office/drawing/2010/main" val="0"/>
+              </a:ext>
+            </a:extLst>
+          </a:blip>
+          <a:stretch>
+            <a:fillRect/>
+          </a:stretch>
+        </p:blipFill>
+        <p:spPr bwMode="auto">
+          <a:xfrm>
+            <a:off x="0" y="-10953"/>
+            <a:ext cx="3795174" cy="6868953"/>
+          </a:xfrm>
+          <a:prstGeom prst="rect">
+            <a:avLst/>
+          </a:prstGeom>
+          <a:noFill/>
+          <a:extLst>
+            <a:ext uri="{909E8E84-426E-40DD-AFC4-6F175D3DCCD1}">
+              <a14:hiddenFill xmlns:a14="http://schemas.microsoft.com/office/drawing/2010/main">
+                <a:solidFill>
+                  <a:srgbClr val="FFFFFF"/>
+                </a:solidFill>
+              </a14:hiddenFill>
+            </a:ext>
+          </a:extLst>
+        </p:spPr>
+      </p:pic>
+      <p:sp>
+        <p:nvSpPr>
+          <p:cNvPr id="2" name="Nadpis 1"/>
+          <p:cNvSpPr>
+            <a:spLocks noGrp="1"/>
+          </p:cNvSpPr>
+          <p:nvPr>
+            <p:ph type="title"/>
+          </p:nvPr>
+        </p:nvSpPr>
+        <p:spPr>
+          <a:xfrm>
+            <a:off x="4211960" y="274638"/>
+            <a:ext cx="4474839" cy="1143000"/>
+          </a:xfrm>
+        </p:spPr>
+        <p:txBody>
+          <a:bodyPr/>
+          <a:lstStyle/>
+          <a:p>
+            <a:pPr algn="r"/>
+            <a:r>
+              <a:rPr lang="cs-CZ" dirty="0" smtClean="0"/>
+              <a:t>Menu</a:t>
+            </a:r>
+            <a:endParaRPr lang="cs-CZ" dirty="0"/>
+          </a:p>
+        </p:txBody>
+      </p:sp>
+      <p:sp>
+        <p:nvSpPr>
+          <p:cNvPr id="3" name="Zástupný symbol pro obsah 2"/>
+          <p:cNvSpPr>
+            <a:spLocks noGrp="1"/>
+          </p:cNvSpPr>
+          <p:nvPr>
+            <p:ph idx="1"/>
+          </p:nvPr>
+        </p:nvSpPr>
+        <p:spPr>
+          <a:xfrm>
+            <a:off x="4067944" y="1600200"/>
+            <a:ext cx="4618856" cy="4525963"/>
+          </a:xfrm>
+        </p:spPr>
+        <p:txBody>
+          <a:bodyPr>
+            <a:normAutofit fontScale="92500" lnSpcReduction="10000"/>
+          </a:bodyPr>
+          <a:lstStyle/>
+          <a:p>
+            <a:r>
+              <a:rPr lang="cs-CZ" dirty="0" smtClean="0"/>
+              <a:t>Přehledné menu</a:t>
+            </a:r>
+          </a:p>
+          <a:p>
+            <a:r>
+              <a:rPr lang="cs-CZ" dirty="0" smtClean="0"/>
+              <a:t>Vlastní účet</a:t>
+            </a:r>
+          </a:p>
+          <a:p>
+            <a:r>
+              <a:rPr lang="cs-CZ" dirty="0" smtClean="0"/>
+              <a:t>Seznam provedených nákupů</a:t>
+            </a:r>
+          </a:p>
+          <a:p>
+            <a:pPr lvl="1"/>
+            <a:r>
+              <a:rPr lang="cs-CZ" dirty="0" smtClean="0"/>
+              <a:t>Uživatelských seznamů</a:t>
+            </a:r>
+          </a:p>
+          <a:p>
+            <a:r>
+              <a:rPr lang="cs-CZ" dirty="0" smtClean="0"/>
+              <a:t>Recepty jídel</a:t>
+            </a:r>
+          </a:p>
+          <a:p>
+            <a:r>
+              <a:rPr lang="cs-CZ" dirty="0" smtClean="0"/>
+              <a:t>Uživatelské skupiny</a:t>
+            </a:r>
+          </a:p>
+          <a:p>
+            <a:r>
+              <a:rPr lang="cs-CZ" dirty="0" smtClean="0"/>
+              <a:t>Nastavení chování aplikace</a:t>
+            </a:r>
+          </a:p>
+        </p:txBody>
+      </p:sp>
+    </p:spTree>
+    <p:extLst>
+      <p:ext uri="{BB962C8B-B14F-4D97-AF65-F5344CB8AC3E}">
+        <p14:creationId xmlns:p14="http://schemas.microsoft.com/office/powerpoint/2010/main" val="2503498908"/>
+      </p:ext>
+    </p:extLst>
+  </p:cSld>
+  <p:clrMapOvr>
+    <a:masterClrMapping/>
+  </p:clrMapOvr>
+  <mc:AlternateContent xmlns:mc="http://schemas.openxmlformats.org/markup-compatibility/2006">
+    <mc:Choice xmlns:p14="http://schemas.microsoft.com/office/powerpoint/2010/main" Requires="p14">
+      <p:transition>
+        <p14:prism/>
+      </p:transition>
+    </mc:Choice>
+    <mc:Fallback>
+      <p:transition>
+        <p:fade/>
+      </p:transition>
+    </mc:Fallback>
+  </mc:AlternateContent>
+  <p:timing>
+    <p:tnLst>
+      <p:par>
+        <p:cTn id="1" dur="indefinite" restart="never" nodeType="tmRoot"/>
+      </p:par>
+    </p:tnLst>
+  </p:timing>
+</p:sld>
+</file>
+
+<file path=ppt/slides/slide9.xml><?xml version="1.0" encoding="utf-8"?>
+<p:sld xmlns:a="http://schemas.openxmlformats.org/drawingml/2006/main" xmlns:r="http://schemas.openxmlformats.org/officeDocument/2006/relationships" xmlns:p="http://schemas.openxmlformats.org/presentationml/2006/main">
+  <p:cSld>
+    <p:spTree>
+      <p:nvGrpSpPr>
+        <p:cNvPr id="1" name=""/>
+        <p:cNvGrpSpPr/>
+        <p:nvPr/>
+      </p:nvGrpSpPr>
+      <p:grpSpPr>
+        <a:xfrm>
+          <a:off x="0" y="0"/>
+          <a:ext cx="0" cy="0"/>
+          <a:chOff x="0" y="0"/>
+          <a:chExt cx="0" cy="0"/>
+        </a:xfrm>
+      </p:grpSpPr>
+      <p:pic>
+        <p:nvPicPr>
+          <p:cNvPr id="1026" name="Picture 2"/>
+          <p:cNvPicPr>
+            <a:picLocks noChangeAspect="1" noChangeArrowheads="1"/>
+          </p:cNvPicPr>
+          <p:nvPr/>
+        </p:nvPicPr>
+        <p:blipFill>
+          <a:blip r:embed="rId2">
+            <a:extLst>
+              <a:ext uri="{28A0092B-C50C-407E-A947-70E740481C1C}">
+                <a14:useLocalDpi xmlns:a14="http://schemas.microsoft.com/office/drawing/2010/main" val="0"/>
+              </a:ext>
+            </a:extLst>
+          </a:blip>
+          <a:stretch>
+            <a:fillRect/>
+          </a:stretch>
+        </p:blipFill>
+        <p:spPr bwMode="auto">
+          <a:xfrm>
+            <a:off x="0" y="-10953"/>
+            <a:ext cx="3795174" cy="6868953"/>
+          </a:xfrm>
+          <a:prstGeom prst="rect">
+            <a:avLst/>
+          </a:prstGeom>
+          <a:noFill/>
+          <a:extLst>
+            <a:ext uri="{909E8E84-426E-40DD-AFC4-6F175D3DCCD1}">
+              <a14:hiddenFill xmlns:a14="http://schemas.microsoft.com/office/drawing/2010/main">
+                <a:solidFill>
+                  <a:srgbClr val="FFFFFF"/>
+                </a:solidFill>
+              </a14:hiddenFill>
+            </a:ext>
+          </a:extLst>
+        </p:spPr>
+      </p:pic>
+      <p:sp>
+        <p:nvSpPr>
+          <p:cNvPr id="2" name="Nadpis 1"/>
+          <p:cNvSpPr>
+            <a:spLocks noGrp="1"/>
+          </p:cNvSpPr>
+          <p:nvPr>
+            <p:ph type="title"/>
+          </p:nvPr>
+        </p:nvSpPr>
+        <p:spPr>
+          <a:xfrm>
+            <a:off x="4211960" y="274638"/>
+            <a:ext cx="4474839" cy="1143000"/>
+          </a:xfrm>
+        </p:spPr>
+        <p:txBody>
+          <a:bodyPr/>
+          <a:lstStyle/>
+          <a:p>
+            <a:pPr algn="r"/>
+            <a:r>
+              <a:rPr lang="cs-CZ" dirty="0" smtClean="0"/>
+              <a:t>Zákazníkův účet</a:t>
+            </a:r>
+            <a:endParaRPr lang="cs-CZ" dirty="0"/>
+          </a:p>
+        </p:txBody>
+      </p:sp>
+      <p:sp>
+        <p:nvSpPr>
+          <p:cNvPr id="3" name="Zástupný symbol pro obsah 2"/>
+          <p:cNvSpPr>
+            <a:spLocks noGrp="1"/>
+          </p:cNvSpPr>
+          <p:nvPr>
+            <p:ph idx="1"/>
+          </p:nvPr>
+        </p:nvSpPr>
+        <p:spPr>
+          <a:xfrm>
+            <a:off x="4067944" y="1600200"/>
+            <a:ext cx="4618856" cy="4525963"/>
+          </a:xfrm>
+        </p:spPr>
+        <p:txBody>
+          <a:bodyPr>
+            <a:normAutofit/>
+          </a:bodyPr>
+          <a:lstStyle/>
+          <a:p>
+            <a:r>
+              <a:rPr lang="cs-CZ" dirty="0" smtClean="0"/>
+              <a:t>Základní informace o uživateli</a:t>
+            </a:r>
+          </a:p>
+          <a:p>
+            <a:r>
+              <a:rPr lang="cs-CZ" dirty="0" smtClean="0"/>
+              <a:t>Získaná ocenění</a:t>
+            </a:r>
+          </a:p>
+          <a:p>
+            <a:r>
+              <a:rPr lang="cs-CZ" dirty="0" smtClean="0"/>
+              <a:t>Blízká ocenění</a:t>
+            </a:r>
+          </a:p>
+          <a:p>
+            <a:r>
+              <a:rPr lang="cs-CZ" dirty="0" smtClean="0"/>
+              <a:t>Interakce na soc. síti</a:t>
+            </a:r>
+          </a:p>
+        </p:txBody>
+      </p:sp>
+    </p:spTree>
+    <p:extLst>
+      <p:ext uri="{BB962C8B-B14F-4D97-AF65-F5344CB8AC3E}">
+        <p14:creationId xmlns:p14="http://schemas.microsoft.com/office/powerpoint/2010/main" val="3360157751"/>
+      </p:ext>
+    </p:extLst>
+  </p:cSld>
+  <p:clrMapOvr>
+    <a:masterClrMapping/>
+  </p:clrMapOvr>
+  <mc:AlternateContent xmlns:mc="http://schemas.openxmlformats.org/markup-compatibility/2006">
+    <mc:Choice xmlns:p14="http://schemas.microsoft.com/office/powerpoint/2010/main" Requires="p14">
+      <p:transition>
+        <p14:prism/>
+      </p:transition>
+    </mc:Choice>
+    <mc:Fallback>
+      <p:transition>
+        <p:fade/>
+      </p:transition>
+    </mc:Fallback>
+  </mc:AlternateContent>
+  <p:timing>
+    <p:tnLst>
+      <p:par>
+        <p:cTn id="1" dur="indefinite" restart="never" nodeType="tmRoot"/>
+      </p:par>
+    </p:tnLst>
+  </p:timing>
 </p:sld>
 </file>
 

</xml_diff>